<commit_message>
Improvements on "04.2. Loops - Advanced *" slides
</commit_message>
<xml_diff>
--- a/Courses/Software-Sciences/Module-1-OOP-New/04.2-Loops-Advanced/04.2-Loops-Advanced.pptx
+++ b/Courses/Software-Sciences/Module-1-OOP-New/04.2-Loops-Advanced/04.2-Loops-Advanced.pptx
@@ -306,7 +306,7 @@
             </a:lvl1pPr>
           </a:lstStyle>
           <a:p>
-            <a:endParaRPr lang="bg-BG"/>
+            <a:endParaRPr lang="bg-BG" dirty="0"/>
           </a:p>
         </p:txBody>
       </p:sp>
@@ -345,9 +345,9 @@
           <a:p>
             <a:fld id="{4E087215-0C8F-4762-A664-737A353EC9A4}" type="datetimeFigureOut">
               <a:rPr lang="bg-BG" smtClean="0"/>
-              <a:t>19.01.23 г.</a:t>
+              <a:t>3.02.23 г.</a:t>
             </a:fld>
-            <a:endParaRPr lang="bg-BG"/>
+            <a:endParaRPr lang="bg-BG" dirty="0"/>
           </a:p>
         </p:txBody>
       </p:sp>
@@ -503,7 +503,7 @@
             </a:lvl1pPr>
           </a:lstStyle>
           <a:p>
-            <a:endParaRPr lang="en-US"/>
+            <a:endParaRPr lang="en-US" dirty="0"/>
           </a:p>
         </p:txBody>
       </p:sp>
@@ -536,9 +536,9 @@
           <a:p>
             <a:fld id="{72D84649-876A-46C9-8472-14CB09C070D8}" type="datetimeFigureOut">
               <a:rPr lang="en-US" smtClean="0"/>
-              <a:t>1/19/23</a:t>
+              <a:t>2/3/23</a:t>
             </a:fld>
-            <a:endParaRPr lang="en-US"/>
+            <a:endParaRPr lang="en-US" dirty="0"/>
           </a:p>
         </p:txBody>
       </p:sp>
@@ -571,7 +571,7 @@
           <a:bodyPr vert="horz" lIns="91440" tIns="45720" rIns="91440" bIns="45720" rtlCol="0" anchor="ctr"/>
           <a:lstStyle/>
           <a:p>
-            <a:endParaRPr lang="en-US"/>
+            <a:endParaRPr lang="en-US" dirty="0"/>
           </a:p>
         </p:txBody>
       </p:sp>
@@ -1542,7 +1542,7 @@
           <a:bodyPr/>
           <a:lstStyle/>
           <a:p>
-            <a:endParaRPr lang="en-BG" dirty="0"/>
+            <a:endParaRPr lang="en-BG"/>
           </a:p>
         </p:txBody>
       </p:sp>
@@ -1563,7 +1563,7 @@
           <a:p>
             <a:fld id="{2BF067CD-8E6B-4360-9AA8-C5DF2A48A6D1}" type="slidenum">
               <a:rPr lang="en-US" smtClean="0"/>
-              <a:t>38</a:t>
+              <a:t>31</a:t>
             </a:fld>
             <a:endParaRPr lang="en-US" dirty="0"/>
           </a:p>
@@ -1585,27 +1585,26 @@
           <a:lstStyle/>
           <a:p>
             <a:r>
-              <a:rPr lang="en-US"/>
+              <a:rPr lang="en-US" dirty="0"/>
               <a:t>© SoftUni – </a:t>
             </a:r>
             <a:r>
-              <a:rPr lang="en-US" u="sng">
+              <a:rPr lang="en-US" u="sng" dirty="0">
                 <a:hlinkClick r:id="rId3"/>
               </a:rPr>
               <a:t>https://softuni.org</a:t>
             </a:r>
             <a:r>
-              <a:rPr lang="en-US"/>
+              <a:rPr lang="en-US" dirty="0"/>
               <a:t>. Copyrighted document. Unauthorized copy or reproduction is not permitted.</a:t>
             </a:r>
-            <a:endParaRPr lang="en-US" dirty="0"/>
           </a:p>
         </p:txBody>
       </p:sp>
     </p:spTree>
     <p:extLst>
       <p:ext uri="{BB962C8B-B14F-4D97-AF65-F5344CB8AC3E}">
-        <p14:creationId xmlns:p14="http://schemas.microsoft.com/office/powerpoint/2010/main" val="3240559256"/>
+        <p14:creationId xmlns:p14="http://schemas.microsoft.com/office/powerpoint/2010/main" val="3419364080"/>
       </p:ext>
     </p:extLst>
   </p:cSld>
@@ -1659,18 +1658,18 @@
           <a:bodyPr/>
           <a:lstStyle/>
           <a:p>
-            <a:endParaRPr lang="en-US"/>
+            <a:endParaRPr lang="en-BG"/>
           </a:p>
         </p:txBody>
       </p:sp>
       <p:sp>
         <p:nvSpPr>
-          <p:cNvPr id="5" name="Slide Number Placeholder 4"/>
+          <p:cNvPr id="4" name="Slide Number Placeholder 3"/>
           <p:cNvSpPr>
             <a:spLocks noGrp="1"/>
           </p:cNvSpPr>
           <p:nvPr>
-            <p:ph type="sldNum" sz="quarter" idx="11"/>
+            <p:ph type="sldNum" sz="quarter" idx="5"/>
           </p:nvPr>
         </p:nvSpPr>
         <p:spPr/>
@@ -1678,10 +1677,9 @@
           <a:bodyPr/>
           <a:lstStyle/>
           <a:p>
-            <a:fld id="{3EBA5BD7-F043-4D1B-AA17-CD412FC534DE}" type="slidenum">
+            <a:fld id="{2BF067CD-8E6B-4360-9AA8-C5DF2A48A6D1}" type="slidenum">
               <a:rPr lang="en-US" smtClean="0"/>
-              <a:pPr/>
-              <a:t>45</a:t>
+              <a:t>35</a:t>
             </a:fld>
             <a:endParaRPr lang="en-US" dirty="0"/>
           </a:p>
@@ -1689,13 +1687,7 @@
       </p:sp>
       <p:sp>
         <p:nvSpPr>
-          <p:cNvPr id="6" name="Footer Placeholder 7">
-            <a:extLst>
-              <a:ext uri="{FF2B5EF4-FFF2-40B4-BE49-F238E27FC236}">
-                <a16:creationId xmlns:a16="http://schemas.microsoft.com/office/drawing/2014/main" id="{98538354-B696-480A-9C9C-21C1195F1A24}"/>
-              </a:ext>
-            </a:extLst>
-          </p:cNvPr>
+          <p:cNvPr id="5" name="Footer Placeholder 4"/>
           <p:cNvSpPr>
             <a:spLocks noGrp="1"/>
           </p:cNvSpPr>
@@ -1703,22 +1695,10 @@
             <p:ph type="ftr" sz="quarter" idx="4"/>
           </p:nvPr>
         </p:nvSpPr>
-        <p:spPr>
-          <a:xfrm>
-            <a:off x="-1" y="8847000"/>
-            <a:ext cx="6488999" cy="297000"/>
-          </a:xfrm>
-          <a:prstGeom prst="rect">
-            <a:avLst/>
-          </a:prstGeom>
-        </p:spPr>
+        <p:spPr/>
         <p:txBody>
-          <a:bodyPr vert="horz" lIns="91440" tIns="45720" rIns="91440" bIns="45720" rtlCol="0" anchor="b"/>
-          <a:lstStyle>
-            <a:lvl1pPr algn="l">
-              <a:defRPr sz="1100"/>
-            </a:lvl1pPr>
-          </a:lstStyle>
+          <a:bodyPr/>
+          <a:lstStyle/>
           <a:p>
             <a:r>
               <a:rPr lang="en-US" dirty="0"/>
@@ -1740,7 +1720,7 @@
     </p:spTree>
     <p:extLst>
       <p:ext uri="{BB962C8B-B14F-4D97-AF65-F5344CB8AC3E}">
-        <p14:creationId xmlns:p14="http://schemas.microsoft.com/office/powerpoint/2010/main" val="2791254048"/>
+        <p14:creationId xmlns:p14="http://schemas.microsoft.com/office/powerpoint/2010/main" val="2733594350"/>
       </p:ext>
     </p:extLst>
   </p:cSld>
@@ -1794,135 +1774,28 @@
           <a:bodyPr/>
           <a:lstStyle/>
           <a:p>
-            <a:endParaRPr lang="en-US"/>
+            <a:endParaRPr lang="en-BG"/>
           </a:p>
         </p:txBody>
       </p:sp>
       <p:sp>
         <p:nvSpPr>
-          <p:cNvPr id="7" name="Slide Number Placeholder 5">
-            <a:extLst>
-              <a:ext uri="{FF2B5EF4-FFF2-40B4-BE49-F238E27FC236}">
-                <a16:creationId xmlns:a16="http://schemas.microsoft.com/office/drawing/2014/main" id="{5049B984-F964-47FF-8179-0A3007CE21CD}"/>
-              </a:ext>
-            </a:extLst>
-          </p:cNvPr>
-          <p:cNvSpPr txBox="1">
-            <a:spLocks/>
+          <p:cNvPr id="4" name="Slide Number Placeholder 3"/>
+          <p:cNvSpPr>
+            <a:spLocks noGrp="1"/>
           </p:cNvSpPr>
-          <p:nvPr/>
+          <p:nvPr>
+            <p:ph type="sldNum" sz="quarter" idx="5"/>
+          </p:nvPr>
         </p:nvSpPr>
-        <p:spPr>
-          <a:xfrm>
-            <a:off x="6488999" y="8847000"/>
-            <a:ext cx="367414" cy="297000"/>
-          </a:xfrm>
-          <a:prstGeom prst="rect">
-            <a:avLst/>
-          </a:prstGeom>
-        </p:spPr>
+        <p:spPr/>
         <p:txBody>
-          <a:bodyPr vert="horz" lIns="91440" tIns="45720" rIns="91440" bIns="45720" rtlCol="0" anchor="b"/>
-          <a:lstStyle>
-            <a:defPPr>
-              <a:defRPr lang="en-US"/>
-            </a:defPPr>
-            <a:lvl1pPr marL="0" algn="r" defTabSz="914400" rtl="0" eaLnBrk="1" latinLnBrk="0" hangingPunct="1">
-              <a:defRPr sz="1200" kern="1200">
-                <a:solidFill>
-                  <a:schemeClr val="tx1"/>
-                </a:solidFill>
-                <a:latin typeface="+mn-lt"/>
-                <a:ea typeface="+mn-ea"/>
-                <a:cs typeface="+mn-cs"/>
-              </a:defRPr>
-            </a:lvl1pPr>
-            <a:lvl2pPr marL="457200" algn="l" defTabSz="914400" rtl="0" eaLnBrk="1" latinLnBrk="0" hangingPunct="1">
-              <a:defRPr sz="1800" kern="1200">
-                <a:solidFill>
-                  <a:schemeClr val="tx1"/>
-                </a:solidFill>
-                <a:latin typeface="+mn-lt"/>
-                <a:ea typeface="+mn-ea"/>
-                <a:cs typeface="+mn-cs"/>
-              </a:defRPr>
-            </a:lvl2pPr>
-            <a:lvl3pPr marL="914400" algn="l" defTabSz="914400" rtl="0" eaLnBrk="1" latinLnBrk="0" hangingPunct="1">
-              <a:defRPr sz="1800" kern="1200">
-                <a:solidFill>
-                  <a:schemeClr val="tx1"/>
-                </a:solidFill>
-                <a:latin typeface="+mn-lt"/>
-                <a:ea typeface="+mn-ea"/>
-                <a:cs typeface="+mn-cs"/>
-              </a:defRPr>
-            </a:lvl3pPr>
-            <a:lvl4pPr marL="1371600" algn="l" defTabSz="914400" rtl="0" eaLnBrk="1" latinLnBrk="0" hangingPunct="1">
-              <a:defRPr sz="1800" kern="1200">
-                <a:solidFill>
-                  <a:schemeClr val="tx1"/>
-                </a:solidFill>
-                <a:latin typeface="+mn-lt"/>
-                <a:ea typeface="+mn-ea"/>
-                <a:cs typeface="+mn-cs"/>
-              </a:defRPr>
-            </a:lvl4pPr>
-            <a:lvl5pPr marL="1828800" algn="l" defTabSz="914400" rtl="0" eaLnBrk="1" latinLnBrk="0" hangingPunct="1">
-              <a:defRPr sz="1800" kern="1200">
-                <a:solidFill>
-                  <a:schemeClr val="tx1"/>
-                </a:solidFill>
-                <a:latin typeface="+mn-lt"/>
-                <a:ea typeface="+mn-ea"/>
-                <a:cs typeface="+mn-cs"/>
-              </a:defRPr>
-            </a:lvl5pPr>
-            <a:lvl6pPr marL="2286000" algn="l" defTabSz="914400" rtl="0" eaLnBrk="1" latinLnBrk="0" hangingPunct="1">
-              <a:defRPr sz="1800" kern="1200">
-                <a:solidFill>
-                  <a:schemeClr val="tx1"/>
-                </a:solidFill>
-                <a:latin typeface="+mn-lt"/>
-                <a:ea typeface="+mn-ea"/>
-                <a:cs typeface="+mn-cs"/>
-              </a:defRPr>
-            </a:lvl6pPr>
-            <a:lvl7pPr marL="2743200" algn="l" defTabSz="914400" rtl="0" eaLnBrk="1" latinLnBrk="0" hangingPunct="1">
-              <a:defRPr sz="1800" kern="1200">
-                <a:solidFill>
-                  <a:schemeClr val="tx1"/>
-                </a:solidFill>
-                <a:latin typeface="+mn-lt"/>
-                <a:ea typeface="+mn-ea"/>
-                <a:cs typeface="+mn-cs"/>
-              </a:defRPr>
-            </a:lvl7pPr>
-            <a:lvl8pPr marL="3200400" algn="l" defTabSz="914400" rtl="0" eaLnBrk="1" latinLnBrk="0" hangingPunct="1">
-              <a:defRPr sz="1800" kern="1200">
-                <a:solidFill>
-                  <a:schemeClr val="tx1"/>
-                </a:solidFill>
-                <a:latin typeface="+mn-lt"/>
-                <a:ea typeface="+mn-ea"/>
-                <a:cs typeface="+mn-cs"/>
-              </a:defRPr>
-            </a:lvl8pPr>
-            <a:lvl9pPr marL="3657600" algn="l" defTabSz="914400" rtl="0" eaLnBrk="1" latinLnBrk="0" hangingPunct="1">
-              <a:defRPr sz="1800" kern="1200">
-                <a:solidFill>
-                  <a:schemeClr val="tx1"/>
-                </a:solidFill>
-                <a:latin typeface="+mn-lt"/>
-                <a:ea typeface="+mn-ea"/>
-                <a:cs typeface="+mn-cs"/>
-              </a:defRPr>
-            </a:lvl9pPr>
-          </a:lstStyle>
-          <a:p>
-            <a:fld id="{3EBA5BD7-F043-4D1B-AA17-CD412FC534DE}" type="slidenum">
+          <a:bodyPr/>
+          <a:lstStyle/>
+          <a:p>
+            <a:fld id="{2BF067CD-8E6B-4360-9AA8-C5DF2A48A6D1}" type="slidenum">
               <a:rPr lang="en-US" smtClean="0"/>
-              <a:pPr/>
-              <a:t>46</a:t>
+              <a:t>38</a:t>
             </a:fld>
             <a:endParaRPr lang="en-US" dirty="0"/>
           </a:p>
@@ -1930,13 +1803,7 @@
       </p:sp>
       <p:sp>
         <p:nvSpPr>
-          <p:cNvPr id="6" name="Footer Placeholder 7">
-            <a:extLst>
-              <a:ext uri="{FF2B5EF4-FFF2-40B4-BE49-F238E27FC236}">
-                <a16:creationId xmlns:a16="http://schemas.microsoft.com/office/drawing/2014/main" id="{3FAFC322-A821-4ED1-B86A-429BF73C1668}"/>
-              </a:ext>
-            </a:extLst>
-          </p:cNvPr>
+          <p:cNvPr id="5" name="Footer Placeholder 4"/>
           <p:cNvSpPr>
             <a:spLocks noGrp="1"/>
           </p:cNvSpPr>
@@ -1944,22 +1811,10 @@
             <p:ph type="ftr" sz="quarter" idx="4"/>
           </p:nvPr>
         </p:nvSpPr>
-        <p:spPr>
-          <a:xfrm>
-            <a:off x="-1" y="8847000"/>
-            <a:ext cx="6488999" cy="297000"/>
-          </a:xfrm>
-          <a:prstGeom prst="rect">
-            <a:avLst/>
-          </a:prstGeom>
-        </p:spPr>
+        <p:spPr/>
         <p:txBody>
-          <a:bodyPr vert="horz" lIns="91440" tIns="45720" rIns="91440" bIns="45720" rtlCol="0" anchor="b"/>
-          <a:lstStyle>
-            <a:lvl1pPr algn="l">
-              <a:defRPr sz="1100"/>
-            </a:lvl1pPr>
-          </a:lstStyle>
+          <a:bodyPr/>
+          <a:lstStyle/>
           <a:p>
             <a:r>
               <a:rPr lang="en-US" dirty="0"/>
@@ -1981,7 +1836,7 @@
     </p:spTree>
     <p:extLst>
       <p:ext uri="{BB962C8B-B14F-4D97-AF65-F5344CB8AC3E}">
-        <p14:creationId xmlns:p14="http://schemas.microsoft.com/office/powerpoint/2010/main" val="532936466"/>
+        <p14:creationId xmlns:p14="http://schemas.microsoft.com/office/powerpoint/2010/main" val="3240559256"/>
       </p:ext>
     </p:extLst>
   </p:cSld>
@@ -2035,135 +1890,29 @@
           <a:bodyPr/>
           <a:lstStyle/>
           <a:p>
-            <a:endParaRPr lang="en-US"/>
+            <a:endParaRPr lang="en-US" dirty="0"/>
           </a:p>
         </p:txBody>
       </p:sp>
       <p:sp>
         <p:nvSpPr>
-          <p:cNvPr id="6" name="Slide Number Placeholder 5">
-            <a:extLst>
-              <a:ext uri="{FF2B5EF4-FFF2-40B4-BE49-F238E27FC236}">
-                <a16:creationId xmlns:a16="http://schemas.microsoft.com/office/drawing/2014/main" id="{6627548A-4D3C-449B-81A5-FA4BE4628490}"/>
-              </a:ext>
-            </a:extLst>
-          </p:cNvPr>
-          <p:cNvSpPr txBox="1">
-            <a:spLocks/>
+          <p:cNvPr id="5" name="Slide Number Placeholder 4"/>
+          <p:cNvSpPr>
+            <a:spLocks noGrp="1"/>
           </p:cNvSpPr>
-          <p:nvPr/>
+          <p:nvPr>
+            <p:ph type="sldNum" sz="quarter" idx="11"/>
+          </p:nvPr>
         </p:nvSpPr>
-        <p:spPr>
-          <a:xfrm>
-            <a:off x="6488999" y="8847000"/>
-            <a:ext cx="367414" cy="297000"/>
-          </a:xfrm>
-          <a:prstGeom prst="rect">
-            <a:avLst/>
-          </a:prstGeom>
-        </p:spPr>
+        <p:spPr/>
         <p:txBody>
-          <a:bodyPr vert="horz" lIns="91440" tIns="45720" rIns="91440" bIns="45720" rtlCol="0" anchor="b"/>
-          <a:lstStyle>
-            <a:defPPr>
-              <a:defRPr lang="en-US"/>
-            </a:defPPr>
-            <a:lvl1pPr marL="0" algn="r" defTabSz="914400" rtl="0" eaLnBrk="1" latinLnBrk="0" hangingPunct="1">
-              <a:defRPr sz="1200" kern="1200">
-                <a:solidFill>
-                  <a:schemeClr val="tx1"/>
-                </a:solidFill>
-                <a:latin typeface="+mn-lt"/>
-                <a:ea typeface="+mn-ea"/>
-                <a:cs typeface="+mn-cs"/>
-              </a:defRPr>
-            </a:lvl1pPr>
-            <a:lvl2pPr marL="457200" algn="l" defTabSz="914400" rtl="0" eaLnBrk="1" latinLnBrk="0" hangingPunct="1">
-              <a:defRPr sz="1800" kern="1200">
-                <a:solidFill>
-                  <a:schemeClr val="tx1"/>
-                </a:solidFill>
-                <a:latin typeface="+mn-lt"/>
-                <a:ea typeface="+mn-ea"/>
-                <a:cs typeface="+mn-cs"/>
-              </a:defRPr>
-            </a:lvl2pPr>
-            <a:lvl3pPr marL="914400" algn="l" defTabSz="914400" rtl="0" eaLnBrk="1" latinLnBrk="0" hangingPunct="1">
-              <a:defRPr sz="1800" kern="1200">
-                <a:solidFill>
-                  <a:schemeClr val="tx1"/>
-                </a:solidFill>
-                <a:latin typeface="+mn-lt"/>
-                <a:ea typeface="+mn-ea"/>
-                <a:cs typeface="+mn-cs"/>
-              </a:defRPr>
-            </a:lvl3pPr>
-            <a:lvl4pPr marL="1371600" algn="l" defTabSz="914400" rtl="0" eaLnBrk="1" latinLnBrk="0" hangingPunct="1">
-              <a:defRPr sz="1800" kern="1200">
-                <a:solidFill>
-                  <a:schemeClr val="tx1"/>
-                </a:solidFill>
-                <a:latin typeface="+mn-lt"/>
-                <a:ea typeface="+mn-ea"/>
-                <a:cs typeface="+mn-cs"/>
-              </a:defRPr>
-            </a:lvl4pPr>
-            <a:lvl5pPr marL="1828800" algn="l" defTabSz="914400" rtl="0" eaLnBrk="1" latinLnBrk="0" hangingPunct="1">
-              <a:defRPr sz="1800" kern="1200">
-                <a:solidFill>
-                  <a:schemeClr val="tx1"/>
-                </a:solidFill>
-                <a:latin typeface="+mn-lt"/>
-                <a:ea typeface="+mn-ea"/>
-                <a:cs typeface="+mn-cs"/>
-              </a:defRPr>
-            </a:lvl5pPr>
-            <a:lvl6pPr marL="2286000" algn="l" defTabSz="914400" rtl="0" eaLnBrk="1" latinLnBrk="0" hangingPunct="1">
-              <a:defRPr sz="1800" kern="1200">
-                <a:solidFill>
-                  <a:schemeClr val="tx1"/>
-                </a:solidFill>
-                <a:latin typeface="+mn-lt"/>
-                <a:ea typeface="+mn-ea"/>
-                <a:cs typeface="+mn-cs"/>
-              </a:defRPr>
-            </a:lvl6pPr>
-            <a:lvl7pPr marL="2743200" algn="l" defTabSz="914400" rtl="0" eaLnBrk="1" latinLnBrk="0" hangingPunct="1">
-              <a:defRPr sz="1800" kern="1200">
-                <a:solidFill>
-                  <a:schemeClr val="tx1"/>
-                </a:solidFill>
-                <a:latin typeface="+mn-lt"/>
-                <a:ea typeface="+mn-ea"/>
-                <a:cs typeface="+mn-cs"/>
-              </a:defRPr>
-            </a:lvl7pPr>
-            <a:lvl8pPr marL="3200400" algn="l" defTabSz="914400" rtl="0" eaLnBrk="1" latinLnBrk="0" hangingPunct="1">
-              <a:defRPr sz="1800" kern="1200">
-                <a:solidFill>
-                  <a:schemeClr val="tx1"/>
-                </a:solidFill>
-                <a:latin typeface="+mn-lt"/>
-                <a:ea typeface="+mn-ea"/>
-                <a:cs typeface="+mn-cs"/>
-              </a:defRPr>
-            </a:lvl8pPr>
-            <a:lvl9pPr marL="3657600" algn="l" defTabSz="914400" rtl="0" eaLnBrk="1" latinLnBrk="0" hangingPunct="1">
-              <a:defRPr sz="1800" kern="1200">
-                <a:solidFill>
-                  <a:schemeClr val="tx1"/>
-                </a:solidFill>
-                <a:latin typeface="+mn-lt"/>
-                <a:ea typeface="+mn-ea"/>
-                <a:cs typeface="+mn-cs"/>
-              </a:defRPr>
-            </a:lvl9pPr>
-          </a:lstStyle>
+          <a:bodyPr/>
+          <a:lstStyle/>
           <a:p>
             <a:fld id="{3EBA5BD7-F043-4D1B-AA17-CD412FC534DE}" type="slidenum">
               <a:rPr lang="en-US" smtClean="0"/>
               <a:pPr/>
-              <a:t>47</a:t>
+              <a:t>45</a:t>
             </a:fld>
             <a:endParaRPr lang="en-US" dirty="0"/>
           </a:p>
@@ -2171,10 +1920,10 @@
       </p:sp>
       <p:sp>
         <p:nvSpPr>
-          <p:cNvPr id="7" name="Footer Placeholder 7">
+          <p:cNvPr id="6" name="Footer Placeholder 7">
             <a:extLst>
               <a:ext uri="{FF2B5EF4-FFF2-40B4-BE49-F238E27FC236}">
-                <a16:creationId xmlns:a16="http://schemas.microsoft.com/office/drawing/2014/main" id="{6F381745-8575-4B7C-9CC1-85A9038DF070}"/>
+                <a16:creationId xmlns:a16="http://schemas.microsoft.com/office/drawing/2014/main" id="{98538354-B696-480A-9C9C-21C1195F1A24}"/>
               </a:ext>
             </a:extLst>
           </p:cNvPr>
@@ -2222,7 +1971,7 @@
     </p:spTree>
     <p:extLst>
       <p:ext uri="{BB962C8B-B14F-4D97-AF65-F5344CB8AC3E}">
-        <p14:creationId xmlns:p14="http://schemas.microsoft.com/office/powerpoint/2010/main" val="1982318969"/>
+        <p14:creationId xmlns:p14="http://schemas.microsoft.com/office/powerpoint/2010/main" val="2791254048"/>
       </p:ext>
     </p:extLst>
   </p:cSld>
@@ -2276,7 +2025,7 @@
           <a:bodyPr/>
           <a:lstStyle/>
           <a:p>
-            <a:endParaRPr lang="en-US"/>
+            <a:endParaRPr lang="en-US" dirty="0"/>
           </a:p>
         </p:txBody>
       </p:sp>
@@ -2285,7 +2034,7 @@
           <p:cNvPr id="7" name="Slide Number Placeholder 5">
             <a:extLst>
               <a:ext uri="{FF2B5EF4-FFF2-40B4-BE49-F238E27FC236}">
-                <a16:creationId xmlns:a16="http://schemas.microsoft.com/office/drawing/2014/main" id="{5D1C0779-821B-433B-AB3A-0953EE966C7E}"/>
+                <a16:creationId xmlns:a16="http://schemas.microsoft.com/office/drawing/2014/main" id="{5049B984-F964-47FF-8179-0A3007CE21CD}"/>
               </a:ext>
             </a:extLst>
           </p:cNvPr>
@@ -2404,7 +2153,7 @@
             <a:fld id="{3EBA5BD7-F043-4D1B-AA17-CD412FC534DE}" type="slidenum">
               <a:rPr lang="en-US" smtClean="0"/>
               <a:pPr/>
-              <a:t>48</a:t>
+              <a:t>46</a:t>
             </a:fld>
             <a:endParaRPr lang="en-US" dirty="0"/>
           </a:p>
@@ -2415,7 +2164,7 @@
           <p:cNvPr id="6" name="Footer Placeholder 7">
             <a:extLst>
               <a:ext uri="{FF2B5EF4-FFF2-40B4-BE49-F238E27FC236}">
-                <a16:creationId xmlns:a16="http://schemas.microsoft.com/office/drawing/2014/main" id="{009C5ADD-2DB4-43B0-B70D-43360D5450FB}"/>
+                <a16:creationId xmlns:a16="http://schemas.microsoft.com/office/drawing/2014/main" id="{3FAFC322-A821-4ED1-B86A-429BF73C1668}"/>
               </a:ext>
             </a:extLst>
           </p:cNvPr>
@@ -2463,7 +2212,248 @@
     </p:spTree>
     <p:extLst>
       <p:ext uri="{BB962C8B-B14F-4D97-AF65-F5344CB8AC3E}">
-        <p14:creationId xmlns:p14="http://schemas.microsoft.com/office/powerpoint/2010/main" val="809290875"/>
+        <p14:creationId xmlns:p14="http://schemas.microsoft.com/office/powerpoint/2010/main" val="532936466"/>
+      </p:ext>
+    </p:extLst>
+  </p:cSld>
+  <p:clrMapOvr>
+    <a:masterClrMapping/>
+  </p:clrMapOvr>
+</p:notes>
+</file>
+
+<file path=ppt/notesSlides/notesSlide19.xml><?xml version="1.0" encoding="utf-8"?>
+<p:notes xmlns:a="http://schemas.openxmlformats.org/drawingml/2006/main" xmlns:r="http://schemas.openxmlformats.org/officeDocument/2006/relationships" xmlns:p="http://schemas.openxmlformats.org/presentationml/2006/main">
+  <p:cSld>
+    <p:spTree>
+      <p:nvGrpSpPr>
+        <p:cNvPr id="1" name=""/>
+        <p:cNvGrpSpPr/>
+        <p:nvPr/>
+      </p:nvGrpSpPr>
+      <p:grpSpPr>
+        <a:xfrm>
+          <a:off x="0" y="0"/>
+          <a:ext cx="0" cy="0"/>
+          <a:chOff x="0" y="0"/>
+          <a:chExt cx="0" cy="0"/>
+        </a:xfrm>
+      </p:grpSpPr>
+      <p:sp>
+        <p:nvSpPr>
+          <p:cNvPr id="2" name="Slide Image Placeholder 1"/>
+          <p:cNvSpPr>
+            <a:spLocks noGrp="1" noRot="1" noChangeAspect="1"/>
+          </p:cNvSpPr>
+          <p:nvPr>
+            <p:ph type="sldImg"/>
+          </p:nvPr>
+        </p:nvSpPr>
+        <p:spPr/>
+      </p:sp>
+      <p:sp>
+        <p:nvSpPr>
+          <p:cNvPr id="3" name="Notes Placeholder 2"/>
+          <p:cNvSpPr>
+            <a:spLocks noGrp="1"/>
+          </p:cNvSpPr>
+          <p:nvPr>
+            <p:ph type="body" idx="1"/>
+          </p:nvPr>
+        </p:nvSpPr>
+        <p:spPr/>
+        <p:txBody>
+          <a:bodyPr/>
+          <a:lstStyle/>
+          <a:p>
+            <a:endParaRPr lang="en-US" dirty="0"/>
+          </a:p>
+        </p:txBody>
+      </p:sp>
+      <p:sp>
+        <p:nvSpPr>
+          <p:cNvPr id="6" name="Slide Number Placeholder 5">
+            <a:extLst>
+              <a:ext uri="{FF2B5EF4-FFF2-40B4-BE49-F238E27FC236}">
+                <a16:creationId xmlns:a16="http://schemas.microsoft.com/office/drawing/2014/main" id="{6627548A-4D3C-449B-81A5-FA4BE4628490}"/>
+              </a:ext>
+            </a:extLst>
+          </p:cNvPr>
+          <p:cNvSpPr txBox="1">
+            <a:spLocks/>
+          </p:cNvSpPr>
+          <p:nvPr/>
+        </p:nvSpPr>
+        <p:spPr>
+          <a:xfrm>
+            <a:off x="6488999" y="8847000"/>
+            <a:ext cx="367414" cy="297000"/>
+          </a:xfrm>
+          <a:prstGeom prst="rect">
+            <a:avLst/>
+          </a:prstGeom>
+        </p:spPr>
+        <p:txBody>
+          <a:bodyPr vert="horz" lIns="91440" tIns="45720" rIns="91440" bIns="45720" rtlCol="0" anchor="b"/>
+          <a:lstStyle>
+            <a:defPPr>
+              <a:defRPr lang="en-US"/>
+            </a:defPPr>
+            <a:lvl1pPr marL="0" algn="r" defTabSz="914400" rtl="0" eaLnBrk="1" latinLnBrk="0" hangingPunct="1">
+              <a:defRPr sz="1200" kern="1200">
+                <a:solidFill>
+                  <a:schemeClr val="tx1"/>
+                </a:solidFill>
+                <a:latin typeface="+mn-lt"/>
+                <a:ea typeface="+mn-ea"/>
+                <a:cs typeface="+mn-cs"/>
+              </a:defRPr>
+            </a:lvl1pPr>
+            <a:lvl2pPr marL="457200" algn="l" defTabSz="914400" rtl="0" eaLnBrk="1" latinLnBrk="0" hangingPunct="1">
+              <a:defRPr sz="1800" kern="1200">
+                <a:solidFill>
+                  <a:schemeClr val="tx1"/>
+                </a:solidFill>
+                <a:latin typeface="+mn-lt"/>
+                <a:ea typeface="+mn-ea"/>
+                <a:cs typeface="+mn-cs"/>
+              </a:defRPr>
+            </a:lvl2pPr>
+            <a:lvl3pPr marL="914400" algn="l" defTabSz="914400" rtl="0" eaLnBrk="1" latinLnBrk="0" hangingPunct="1">
+              <a:defRPr sz="1800" kern="1200">
+                <a:solidFill>
+                  <a:schemeClr val="tx1"/>
+                </a:solidFill>
+                <a:latin typeface="+mn-lt"/>
+                <a:ea typeface="+mn-ea"/>
+                <a:cs typeface="+mn-cs"/>
+              </a:defRPr>
+            </a:lvl3pPr>
+            <a:lvl4pPr marL="1371600" algn="l" defTabSz="914400" rtl="0" eaLnBrk="1" latinLnBrk="0" hangingPunct="1">
+              <a:defRPr sz="1800" kern="1200">
+                <a:solidFill>
+                  <a:schemeClr val="tx1"/>
+                </a:solidFill>
+                <a:latin typeface="+mn-lt"/>
+                <a:ea typeface="+mn-ea"/>
+                <a:cs typeface="+mn-cs"/>
+              </a:defRPr>
+            </a:lvl4pPr>
+            <a:lvl5pPr marL="1828800" algn="l" defTabSz="914400" rtl="0" eaLnBrk="1" latinLnBrk="0" hangingPunct="1">
+              <a:defRPr sz="1800" kern="1200">
+                <a:solidFill>
+                  <a:schemeClr val="tx1"/>
+                </a:solidFill>
+                <a:latin typeface="+mn-lt"/>
+                <a:ea typeface="+mn-ea"/>
+                <a:cs typeface="+mn-cs"/>
+              </a:defRPr>
+            </a:lvl5pPr>
+            <a:lvl6pPr marL="2286000" algn="l" defTabSz="914400" rtl="0" eaLnBrk="1" latinLnBrk="0" hangingPunct="1">
+              <a:defRPr sz="1800" kern="1200">
+                <a:solidFill>
+                  <a:schemeClr val="tx1"/>
+                </a:solidFill>
+                <a:latin typeface="+mn-lt"/>
+                <a:ea typeface="+mn-ea"/>
+                <a:cs typeface="+mn-cs"/>
+              </a:defRPr>
+            </a:lvl6pPr>
+            <a:lvl7pPr marL="2743200" algn="l" defTabSz="914400" rtl="0" eaLnBrk="1" latinLnBrk="0" hangingPunct="1">
+              <a:defRPr sz="1800" kern="1200">
+                <a:solidFill>
+                  <a:schemeClr val="tx1"/>
+                </a:solidFill>
+                <a:latin typeface="+mn-lt"/>
+                <a:ea typeface="+mn-ea"/>
+                <a:cs typeface="+mn-cs"/>
+              </a:defRPr>
+            </a:lvl7pPr>
+            <a:lvl8pPr marL="3200400" algn="l" defTabSz="914400" rtl="0" eaLnBrk="1" latinLnBrk="0" hangingPunct="1">
+              <a:defRPr sz="1800" kern="1200">
+                <a:solidFill>
+                  <a:schemeClr val="tx1"/>
+                </a:solidFill>
+                <a:latin typeface="+mn-lt"/>
+                <a:ea typeface="+mn-ea"/>
+                <a:cs typeface="+mn-cs"/>
+              </a:defRPr>
+            </a:lvl8pPr>
+            <a:lvl9pPr marL="3657600" algn="l" defTabSz="914400" rtl="0" eaLnBrk="1" latinLnBrk="0" hangingPunct="1">
+              <a:defRPr sz="1800" kern="1200">
+                <a:solidFill>
+                  <a:schemeClr val="tx1"/>
+                </a:solidFill>
+                <a:latin typeface="+mn-lt"/>
+                <a:ea typeface="+mn-ea"/>
+                <a:cs typeface="+mn-cs"/>
+              </a:defRPr>
+            </a:lvl9pPr>
+          </a:lstStyle>
+          <a:p>
+            <a:fld id="{3EBA5BD7-F043-4D1B-AA17-CD412FC534DE}" type="slidenum">
+              <a:rPr lang="en-US" smtClean="0"/>
+              <a:pPr/>
+              <a:t>47</a:t>
+            </a:fld>
+            <a:endParaRPr lang="en-US" dirty="0"/>
+          </a:p>
+        </p:txBody>
+      </p:sp>
+      <p:sp>
+        <p:nvSpPr>
+          <p:cNvPr id="7" name="Footer Placeholder 7">
+            <a:extLst>
+              <a:ext uri="{FF2B5EF4-FFF2-40B4-BE49-F238E27FC236}">
+                <a16:creationId xmlns:a16="http://schemas.microsoft.com/office/drawing/2014/main" id="{6F381745-8575-4B7C-9CC1-85A9038DF070}"/>
+              </a:ext>
+            </a:extLst>
+          </p:cNvPr>
+          <p:cNvSpPr>
+            <a:spLocks noGrp="1"/>
+          </p:cNvSpPr>
+          <p:nvPr>
+            <p:ph type="ftr" sz="quarter" idx="4"/>
+          </p:nvPr>
+        </p:nvSpPr>
+        <p:spPr>
+          <a:xfrm>
+            <a:off x="-1" y="8847000"/>
+            <a:ext cx="6488999" cy="297000"/>
+          </a:xfrm>
+          <a:prstGeom prst="rect">
+            <a:avLst/>
+          </a:prstGeom>
+        </p:spPr>
+        <p:txBody>
+          <a:bodyPr vert="horz" lIns="91440" tIns="45720" rIns="91440" bIns="45720" rtlCol="0" anchor="b"/>
+          <a:lstStyle>
+            <a:lvl1pPr algn="l">
+              <a:defRPr sz="1100"/>
+            </a:lvl1pPr>
+          </a:lstStyle>
+          <a:p>
+            <a:r>
+              <a:rPr lang="en-US" dirty="0"/>
+              <a:t>© SoftUni – </a:t>
+            </a:r>
+            <a:r>
+              <a:rPr lang="en-US" u="sng" dirty="0">
+                <a:hlinkClick r:id="rId3"/>
+              </a:rPr>
+              <a:t>https://softuni.org</a:t>
+            </a:r>
+            <a:r>
+              <a:rPr lang="en-US" dirty="0"/>
+              <a:t>. Copyrighted document. Unauthorized copy or reproduction is not permitted.</a:t>
+            </a:r>
+          </a:p>
+        </p:txBody>
+      </p:sp>
+    </p:spTree>
+    <p:extLst>
+      <p:ext uri="{BB962C8B-B14F-4D97-AF65-F5344CB8AC3E}">
+        <p14:creationId xmlns:p14="http://schemas.microsoft.com/office/powerpoint/2010/main" val="1982318969"/>
       </p:ext>
     </p:extLst>
   </p:cSld>
@@ -2601,6 +2591,247 @@
     <p:extLst>
       <p:ext uri="{BB962C8B-B14F-4D97-AF65-F5344CB8AC3E}">
         <p14:creationId xmlns:p14="http://schemas.microsoft.com/office/powerpoint/2010/main" val="387834586"/>
+      </p:ext>
+    </p:extLst>
+  </p:cSld>
+  <p:clrMapOvr>
+    <a:masterClrMapping/>
+  </p:clrMapOvr>
+</p:notes>
+</file>
+
+<file path=ppt/notesSlides/notesSlide20.xml><?xml version="1.0" encoding="utf-8"?>
+<p:notes xmlns:a="http://schemas.openxmlformats.org/drawingml/2006/main" xmlns:r="http://schemas.openxmlformats.org/officeDocument/2006/relationships" xmlns:p="http://schemas.openxmlformats.org/presentationml/2006/main">
+  <p:cSld>
+    <p:spTree>
+      <p:nvGrpSpPr>
+        <p:cNvPr id="1" name=""/>
+        <p:cNvGrpSpPr/>
+        <p:nvPr/>
+      </p:nvGrpSpPr>
+      <p:grpSpPr>
+        <a:xfrm>
+          <a:off x="0" y="0"/>
+          <a:ext cx="0" cy="0"/>
+          <a:chOff x="0" y="0"/>
+          <a:chExt cx="0" cy="0"/>
+        </a:xfrm>
+      </p:grpSpPr>
+      <p:sp>
+        <p:nvSpPr>
+          <p:cNvPr id="2" name="Slide Image Placeholder 1"/>
+          <p:cNvSpPr>
+            <a:spLocks noGrp="1" noRot="1" noChangeAspect="1"/>
+          </p:cNvSpPr>
+          <p:nvPr>
+            <p:ph type="sldImg"/>
+          </p:nvPr>
+        </p:nvSpPr>
+        <p:spPr/>
+      </p:sp>
+      <p:sp>
+        <p:nvSpPr>
+          <p:cNvPr id="3" name="Notes Placeholder 2"/>
+          <p:cNvSpPr>
+            <a:spLocks noGrp="1"/>
+          </p:cNvSpPr>
+          <p:nvPr>
+            <p:ph type="body" idx="1"/>
+          </p:nvPr>
+        </p:nvSpPr>
+        <p:spPr/>
+        <p:txBody>
+          <a:bodyPr/>
+          <a:lstStyle/>
+          <a:p>
+            <a:endParaRPr lang="en-US" dirty="0"/>
+          </a:p>
+        </p:txBody>
+      </p:sp>
+      <p:sp>
+        <p:nvSpPr>
+          <p:cNvPr id="7" name="Slide Number Placeholder 5">
+            <a:extLst>
+              <a:ext uri="{FF2B5EF4-FFF2-40B4-BE49-F238E27FC236}">
+                <a16:creationId xmlns:a16="http://schemas.microsoft.com/office/drawing/2014/main" id="{5D1C0779-821B-433B-AB3A-0953EE966C7E}"/>
+              </a:ext>
+            </a:extLst>
+          </p:cNvPr>
+          <p:cNvSpPr txBox="1">
+            <a:spLocks/>
+          </p:cNvSpPr>
+          <p:nvPr/>
+        </p:nvSpPr>
+        <p:spPr>
+          <a:xfrm>
+            <a:off x="6488999" y="8847000"/>
+            <a:ext cx="367414" cy="297000"/>
+          </a:xfrm>
+          <a:prstGeom prst="rect">
+            <a:avLst/>
+          </a:prstGeom>
+        </p:spPr>
+        <p:txBody>
+          <a:bodyPr vert="horz" lIns="91440" tIns="45720" rIns="91440" bIns="45720" rtlCol="0" anchor="b"/>
+          <a:lstStyle>
+            <a:defPPr>
+              <a:defRPr lang="en-US"/>
+            </a:defPPr>
+            <a:lvl1pPr marL="0" algn="r" defTabSz="914400" rtl="0" eaLnBrk="1" latinLnBrk="0" hangingPunct="1">
+              <a:defRPr sz="1200" kern="1200">
+                <a:solidFill>
+                  <a:schemeClr val="tx1"/>
+                </a:solidFill>
+                <a:latin typeface="+mn-lt"/>
+                <a:ea typeface="+mn-ea"/>
+                <a:cs typeface="+mn-cs"/>
+              </a:defRPr>
+            </a:lvl1pPr>
+            <a:lvl2pPr marL="457200" algn="l" defTabSz="914400" rtl="0" eaLnBrk="1" latinLnBrk="0" hangingPunct="1">
+              <a:defRPr sz="1800" kern="1200">
+                <a:solidFill>
+                  <a:schemeClr val="tx1"/>
+                </a:solidFill>
+                <a:latin typeface="+mn-lt"/>
+                <a:ea typeface="+mn-ea"/>
+                <a:cs typeface="+mn-cs"/>
+              </a:defRPr>
+            </a:lvl2pPr>
+            <a:lvl3pPr marL="914400" algn="l" defTabSz="914400" rtl="0" eaLnBrk="1" latinLnBrk="0" hangingPunct="1">
+              <a:defRPr sz="1800" kern="1200">
+                <a:solidFill>
+                  <a:schemeClr val="tx1"/>
+                </a:solidFill>
+                <a:latin typeface="+mn-lt"/>
+                <a:ea typeface="+mn-ea"/>
+                <a:cs typeface="+mn-cs"/>
+              </a:defRPr>
+            </a:lvl3pPr>
+            <a:lvl4pPr marL="1371600" algn="l" defTabSz="914400" rtl="0" eaLnBrk="1" latinLnBrk="0" hangingPunct="1">
+              <a:defRPr sz="1800" kern="1200">
+                <a:solidFill>
+                  <a:schemeClr val="tx1"/>
+                </a:solidFill>
+                <a:latin typeface="+mn-lt"/>
+                <a:ea typeface="+mn-ea"/>
+                <a:cs typeface="+mn-cs"/>
+              </a:defRPr>
+            </a:lvl4pPr>
+            <a:lvl5pPr marL="1828800" algn="l" defTabSz="914400" rtl="0" eaLnBrk="1" latinLnBrk="0" hangingPunct="1">
+              <a:defRPr sz="1800" kern="1200">
+                <a:solidFill>
+                  <a:schemeClr val="tx1"/>
+                </a:solidFill>
+                <a:latin typeface="+mn-lt"/>
+                <a:ea typeface="+mn-ea"/>
+                <a:cs typeface="+mn-cs"/>
+              </a:defRPr>
+            </a:lvl5pPr>
+            <a:lvl6pPr marL="2286000" algn="l" defTabSz="914400" rtl="0" eaLnBrk="1" latinLnBrk="0" hangingPunct="1">
+              <a:defRPr sz="1800" kern="1200">
+                <a:solidFill>
+                  <a:schemeClr val="tx1"/>
+                </a:solidFill>
+                <a:latin typeface="+mn-lt"/>
+                <a:ea typeface="+mn-ea"/>
+                <a:cs typeface="+mn-cs"/>
+              </a:defRPr>
+            </a:lvl6pPr>
+            <a:lvl7pPr marL="2743200" algn="l" defTabSz="914400" rtl="0" eaLnBrk="1" latinLnBrk="0" hangingPunct="1">
+              <a:defRPr sz="1800" kern="1200">
+                <a:solidFill>
+                  <a:schemeClr val="tx1"/>
+                </a:solidFill>
+                <a:latin typeface="+mn-lt"/>
+                <a:ea typeface="+mn-ea"/>
+                <a:cs typeface="+mn-cs"/>
+              </a:defRPr>
+            </a:lvl7pPr>
+            <a:lvl8pPr marL="3200400" algn="l" defTabSz="914400" rtl="0" eaLnBrk="1" latinLnBrk="0" hangingPunct="1">
+              <a:defRPr sz="1800" kern="1200">
+                <a:solidFill>
+                  <a:schemeClr val="tx1"/>
+                </a:solidFill>
+                <a:latin typeface="+mn-lt"/>
+                <a:ea typeface="+mn-ea"/>
+                <a:cs typeface="+mn-cs"/>
+              </a:defRPr>
+            </a:lvl8pPr>
+            <a:lvl9pPr marL="3657600" algn="l" defTabSz="914400" rtl="0" eaLnBrk="1" latinLnBrk="0" hangingPunct="1">
+              <a:defRPr sz="1800" kern="1200">
+                <a:solidFill>
+                  <a:schemeClr val="tx1"/>
+                </a:solidFill>
+                <a:latin typeface="+mn-lt"/>
+                <a:ea typeface="+mn-ea"/>
+                <a:cs typeface="+mn-cs"/>
+              </a:defRPr>
+            </a:lvl9pPr>
+          </a:lstStyle>
+          <a:p>
+            <a:fld id="{3EBA5BD7-F043-4D1B-AA17-CD412FC534DE}" type="slidenum">
+              <a:rPr lang="en-US" smtClean="0"/>
+              <a:pPr/>
+              <a:t>48</a:t>
+            </a:fld>
+            <a:endParaRPr lang="en-US" dirty="0"/>
+          </a:p>
+        </p:txBody>
+      </p:sp>
+      <p:sp>
+        <p:nvSpPr>
+          <p:cNvPr id="6" name="Footer Placeholder 7">
+            <a:extLst>
+              <a:ext uri="{FF2B5EF4-FFF2-40B4-BE49-F238E27FC236}">
+                <a16:creationId xmlns:a16="http://schemas.microsoft.com/office/drawing/2014/main" id="{009C5ADD-2DB4-43B0-B70D-43360D5450FB}"/>
+              </a:ext>
+            </a:extLst>
+          </p:cNvPr>
+          <p:cNvSpPr>
+            <a:spLocks noGrp="1"/>
+          </p:cNvSpPr>
+          <p:nvPr>
+            <p:ph type="ftr" sz="quarter" idx="4"/>
+          </p:nvPr>
+        </p:nvSpPr>
+        <p:spPr>
+          <a:xfrm>
+            <a:off x="-1" y="8847000"/>
+            <a:ext cx="6488999" cy="297000"/>
+          </a:xfrm>
+          <a:prstGeom prst="rect">
+            <a:avLst/>
+          </a:prstGeom>
+        </p:spPr>
+        <p:txBody>
+          <a:bodyPr vert="horz" lIns="91440" tIns="45720" rIns="91440" bIns="45720" rtlCol="0" anchor="b"/>
+          <a:lstStyle>
+            <a:lvl1pPr algn="l">
+              <a:defRPr sz="1100"/>
+            </a:lvl1pPr>
+          </a:lstStyle>
+          <a:p>
+            <a:r>
+              <a:rPr lang="en-US" dirty="0"/>
+              <a:t>© SoftUni – </a:t>
+            </a:r>
+            <a:r>
+              <a:rPr lang="en-US" u="sng" dirty="0">
+                <a:hlinkClick r:id="rId3"/>
+              </a:rPr>
+              <a:t>https://softuni.org</a:t>
+            </a:r>
+            <a:r>
+              <a:rPr lang="en-US" dirty="0"/>
+              <a:t>. Copyrighted document. Unauthorized copy or reproduction is not permitted.</a:t>
+            </a:r>
+          </a:p>
+        </p:txBody>
+      </p:sp>
+    </p:spTree>
+    <p:extLst>
+      <p:ext uri="{BB962C8B-B14F-4D97-AF65-F5344CB8AC3E}">
+        <p14:creationId xmlns:p14="http://schemas.microsoft.com/office/powerpoint/2010/main" val="809290875"/>
       </p:ext>
     </p:extLst>
   </p:cSld>
@@ -3464,7 +3695,7 @@
           <a:bodyPr/>
           <a:lstStyle/>
           <a:p>
-            <a:endParaRPr lang="bg-BG"/>
+            <a:endParaRPr lang="bg-BG" dirty="0"/>
           </a:p>
         </p:txBody>
       </p:sp>
@@ -3636,7 +3867,7 @@
               <a:tabLst/>
               <a:defRPr/>
             </a:pPr>
-            <a:endParaRPr kumimoji="0" lang="en-US" altLang="ko-KR" sz="2398" b="0" i="0" u="none" strike="noStrike" kern="1200" cap="none" spc="0" normalizeH="0" baseline="0" noProof="0">
+            <a:endParaRPr kumimoji="0" lang="en-US" altLang="ko-KR" sz="2398" b="0" i="0" u="none" strike="noStrike" kern="1200" cap="none" spc="0" normalizeH="0" baseline="0" noProof="0" dirty="0">
               <a:ln>
                 <a:noFill/>
               </a:ln>
@@ -4265,7 +4496,7 @@
               <a:tabLst/>
               <a:defRPr/>
             </a:pPr>
-            <a:endParaRPr kumimoji="0" lang="en-US" altLang="ko-KR" sz="2398" b="0" i="0" u="none" strike="noStrike" kern="1200" cap="none" spc="0" normalizeH="0" baseline="0" noProof="0">
+            <a:endParaRPr kumimoji="0" lang="en-US" altLang="ko-KR" sz="2398" b="0" i="0" u="none" strike="noStrike" kern="1200" cap="none" spc="0" normalizeH="0" baseline="0" noProof="0" dirty="0">
               <a:ln>
                 <a:noFill/>
               </a:ln>
@@ -4388,7 +4619,7 @@
               <a:tabLst/>
               <a:defRPr/>
             </a:pPr>
-            <a:endParaRPr kumimoji="0" lang="en-US" altLang="ko-KR" sz="2398" b="0" i="0" u="none" strike="noStrike" kern="1200" cap="none" spc="0" normalizeH="0" baseline="0" noProof="0">
+            <a:endParaRPr kumimoji="0" lang="en-US" altLang="ko-KR" sz="2398" b="0" i="0" u="none" strike="noStrike" kern="1200" cap="none" spc="0" normalizeH="0" baseline="0" noProof="0" dirty="0">
               <a:ln>
                 <a:noFill/>
               </a:ln>
@@ -4661,7 +4892,7 @@
               <a:tabLst/>
               <a:defRPr/>
             </a:pPr>
-            <a:endParaRPr kumimoji="0" lang="en-US" altLang="ko-KR" sz="2398" b="0" i="0" u="none" strike="noStrike" kern="1200" cap="none" spc="0" normalizeH="0" baseline="0" noProof="0">
+            <a:endParaRPr kumimoji="0" lang="en-US" altLang="ko-KR" sz="2398" b="0" i="0" u="none" strike="noStrike" kern="1200" cap="none" spc="0" normalizeH="0" baseline="0" noProof="0" dirty="0">
               <a:ln>
                 <a:noFill/>
               </a:ln>
@@ -4847,7 +5078,7 @@
               <a:pPr/>
               <a:t>‹#›</a:t>
             </a:fld>
-            <a:endParaRPr lang="en-US" noProof="0"/>
+            <a:endParaRPr lang="en-US" noProof="0" dirty="0"/>
           </a:p>
         </p:txBody>
       </p:sp>
@@ -5001,7 +5232,7 @@
           </a:lstStyle>
           <a:p>
             <a:r>
-              <a:rPr lang="en-US" altLang="ko-KR" noProof="0"/>
+              <a:rPr lang="en-US" altLang="ko-KR" noProof="0" dirty="0"/>
               <a:t>Your Picture Here</a:t>
             </a:r>
           </a:p>
@@ -5065,7 +5296,7 @@
               <a:tabLst/>
               <a:defRPr/>
             </a:pPr>
-            <a:endParaRPr kumimoji="0" lang="en-US" altLang="ko-KR" sz="2398" b="0" i="0" u="none" strike="noStrike" kern="1200" cap="none" spc="0" normalizeH="0" baseline="0" noProof="0">
+            <a:endParaRPr kumimoji="0" lang="en-US" altLang="ko-KR" sz="2398" b="0" i="0" u="none" strike="noStrike" kern="1200" cap="none" spc="0" normalizeH="0" baseline="0" noProof="0" dirty="0">
               <a:ln>
                 <a:noFill/>
               </a:ln>
@@ -5140,7 +5371,7 @@
               <a:tabLst/>
               <a:defRPr/>
             </a:pPr>
-            <a:endParaRPr kumimoji="0" lang="en-US" altLang="ko-KR" sz="2398" b="0" i="0" u="none" strike="noStrike" kern="1200" cap="none" spc="0" normalizeH="0" baseline="0" noProof="0">
+            <a:endParaRPr kumimoji="0" lang="en-US" altLang="ko-KR" sz="2398" b="0" i="0" u="none" strike="noStrike" kern="1200" cap="none" spc="0" normalizeH="0" baseline="0" noProof="0" dirty="0">
               <a:ln>
                 <a:noFill/>
               </a:ln>
@@ -5221,7 +5452,7 @@
               <a:tabLst/>
               <a:defRPr/>
             </a:pPr>
-            <a:endParaRPr kumimoji="0" lang="en-US" altLang="ko-KR" sz="2398" b="0" i="0" u="none" strike="noStrike" kern="1200" cap="none" spc="0" normalizeH="0" baseline="0" noProof="0">
+            <a:endParaRPr kumimoji="0" lang="en-US" altLang="ko-KR" sz="2398" b="0" i="0" u="none" strike="noStrike" kern="1200" cap="none" spc="0" normalizeH="0" baseline="0" noProof="0" dirty="0">
               <a:ln>
                 <a:noFill/>
               </a:ln>
@@ -5302,7 +5533,7 @@
               <a:tabLst/>
               <a:defRPr/>
             </a:pPr>
-            <a:endParaRPr kumimoji="0" lang="en-US" altLang="ko-KR" sz="2398" b="0" i="0" u="none" strike="noStrike" kern="1200" cap="none" spc="0" normalizeH="0" baseline="0" noProof="0">
+            <a:endParaRPr kumimoji="0" lang="en-US" altLang="ko-KR" sz="2398" b="0" i="0" u="none" strike="noStrike" kern="1200" cap="none" spc="0" normalizeH="0" baseline="0" noProof="0" dirty="0">
               <a:ln>
                 <a:noFill/>
               </a:ln>
@@ -5506,7 +5737,7 @@
               <a:tabLst/>
               <a:defRPr/>
             </a:pPr>
-            <a:endParaRPr kumimoji="0" lang="en-US" altLang="ko-KR" sz="2398" b="0" i="0" u="none" strike="noStrike" kern="1200" cap="none" spc="0" normalizeH="0" baseline="0" noProof="0">
+            <a:endParaRPr kumimoji="0" lang="en-US" altLang="ko-KR" sz="2398" b="0" i="0" u="none" strike="noStrike" kern="1200" cap="none" spc="0" normalizeH="0" baseline="0" noProof="0" dirty="0">
               <a:ln>
                 <a:noFill/>
               </a:ln>
@@ -7012,7 +7243,7 @@
               <a:tabLst/>
               <a:defRPr/>
             </a:pPr>
-            <a:endParaRPr kumimoji="0" lang="en-US" altLang="ko-KR" sz="2398" b="0" i="0" u="none" strike="noStrike" kern="1200" cap="none" spc="0" normalizeH="0" baseline="0" noProof="0">
+            <a:endParaRPr kumimoji="0" lang="en-US" altLang="ko-KR" sz="2398" b="0" i="0" u="none" strike="noStrike" kern="1200" cap="none" spc="0" normalizeH="0" baseline="0" noProof="0" dirty="0">
               <a:ln>
                 <a:noFill/>
               </a:ln>
@@ -7340,7 +7571,7 @@
               <a:tabLst/>
               <a:defRPr/>
             </a:pPr>
-            <a:endParaRPr kumimoji="0" lang="en-US" altLang="ko-KR" sz="2398" b="0" i="0" u="none" strike="noStrike" kern="1200" cap="none" spc="0" normalizeH="0" baseline="0" noProof="0">
+            <a:endParaRPr kumimoji="0" lang="en-US" altLang="ko-KR" sz="2398" b="0" i="0" u="none" strike="noStrike" kern="1200" cap="none" spc="0" normalizeH="0" baseline="0" noProof="0" dirty="0">
               <a:ln>
                 <a:noFill/>
               </a:ln>
@@ -7510,7 +7741,7 @@
               <a:pPr/>
               <a:t>‹#›</a:t>
             </a:fld>
-            <a:endParaRPr lang="en-US" noProof="0"/>
+            <a:endParaRPr lang="en-US" noProof="0" dirty="0"/>
           </a:p>
         </p:txBody>
       </p:sp>
@@ -7705,7 +7936,7 @@
               <a:tabLst/>
               <a:defRPr/>
             </a:pPr>
-            <a:endParaRPr kumimoji="0" lang="en-US" altLang="ko-KR" sz="2398" b="0" i="0" u="none" strike="noStrike" kern="1200" cap="none" spc="0" normalizeH="0" baseline="0" noProof="0">
+            <a:endParaRPr kumimoji="0" lang="en-US" altLang="ko-KR" sz="2398" b="0" i="0" u="none" strike="noStrike" kern="1200" cap="none" spc="0" normalizeH="0" baseline="0" noProof="0" dirty="0">
               <a:ln>
                 <a:noFill/>
               </a:ln>
@@ -8966,7 +9197,7 @@
               <a:pPr/>
               <a:t>‹#›</a:t>
             </a:fld>
-            <a:endParaRPr lang="en-US" noProof="0"/>
+            <a:endParaRPr lang="en-US" noProof="0" dirty="0"/>
           </a:p>
         </p:txBody>
       </p:sp>
@@ -9034,7 +9265,7 @@
               <a:tabLst/>
               <a:defRPr/>
             </a:pPr>
-            <a:endParaRPr kumimoji="0" lang="en-US" altLang="ko-KR" sz="2398" b="0" i="0" u="none" strike="noStrike" kern="1200" cap="none" spc="0" normalizeH="0" baseline="0" noProof="0">
+            <a:endParaRPr kumimoji="0" lang="en-US" altLang="ko-KR" sz="2398" b="0" i="0" u="none" strike="noStrike" kern="1200" cap="none" spc="0" normalizeH="0" baseline="0" noProof="0" dirty="0">
               <a:ln>
                 <a:noFill/>
               </a:ln>
@@ -9402,7 +9633,7 @@
               <a:tabLst/>
               <a:defRPr/>
             </a:pPr>
-            <a:endParaRPr kumimoji="0" lang="en-US" altLang="ko-KR" sz="2398" b="0" i="0" u="none" strike="noStrike" kern="1200" cap="none" spc="0" normalizeH="0" baseline="0" noProof="0">
+            <a:endParaRPr kumimoji="0" lang="en-US" altLang="ko-KR" sz="2398" b="0" i="0" u="none" strike="noStrike" kern="1200" cap="none" spc="0" normalizeH="0" baseline="0" noProof="0" dirty="0">
               <a:ln>
                 <a:noFill/>
               </a:ln>
@@ -10121,7 +10352,7 @@
           <a:lstStyle/>
           <a:p>
             <a:r>
-              <a:rPr lang="en-US" sz="1799">
+              <a:rPr lang="en-US" sz="1799" dirty="0">
                 <a:hlinkClick r:id="rId3"/>
               </a:rPr>
               <a:t>https://softuni.bg</a:t>
@@ -10352,11 +10583,11 @@
           <a:p>
             <a:r>
               <a:rPr lang="ru-RU" noProof="1"/>
-              <a:t>Лява и дясна сума – условие</a:t>
+              <a:t>Задача: Лява и дясна сума </a:t>
             </a:r>
             <a:r>
               <a:rPr lang="en-US" noProof="1"/>
-              <a:t> (2)</a:t>
+              <a:t>(2)</a:t>
             </a:r>
             <a:endParaRPr lang="bg-BG" noProof="1"/>
           </a:p>
@@ -10372,7 +10603,7 @@
         </p:nvSpPr>
         <p:spPr bwMode="auto">
           <a:xfrm>
-            <a:off x="1925016" y="2327760"/>
+            <a:off x="2150016" y="3047760"/>
             <a:ext cx="761801" cy="2229377"/>
           </a:xfrm>
           <a:prstGeom prst="rect">
@@ -10511,7 +10742,7 @@
         </p:nvSpPr>
         <p:spPr bwMode="auto">
           <a:xfrm>
-            <a:off x="3586615" y="3315581"/>
+            <a:off x="3811615" y="4035581"/>
             <a:ext cx="2842196" cy="531558"/>
           </a:xfrm>
           <a:prstGeom prst="rect">
@@ -10570,7 +10801,7 @@
         </p:nvSpPr>
         <p:spPr>
           <a:xfrm>
-            <a:off x="2909622" y="3429000"/>
+            <a:off x="3134622" y="4149000"/>
             <a:ext cx="457081" cy="304721"/>
           </a:xfrm>
           <a:prstGeom prst="rightArrow">
@@ -10612,7 +10843,7 @@
         </p:nvSpPr>
         <p:spPr bwMode="auto">
           <a:xfrm>
-            <a:off x="6890482" y="2368096"/>
+            <a:off x="7115482" y="3088096"/>
             <a:ext cx="851188" cy="2203606"/>
           </a:xfrm>
           <a:prstGeom prst="rect">
@@ -10752,7 +10983,7 @@
         </p:nvSpPr>
         <p:spPr bwMode="auto">
           <a:xfrm>
-            <a:off x="8655199" y="3307447"/>
+            <a:off x="8880199" y="4027447"/>
             <a:ext cx="2555126" cy="531558"/>
           </a:xfrm>
           <a:prstGeom prst="rect">
@@ -10811,7 +11042,7 @@
         </p:nvSpPr>
         <p:spPr>
           <a:xfrm>
-            <a:off x="7969894" y="3426858"/>
+            <a:off x="8194894" y="4146858"/>
             <a:ext cx="457081" cy="304721"/>
           </a:xfrm>
           <a:prstGeom prst="rightArrow">
@@ -10857,7 +11088,7 @@
         </p:nvSpPr>
         <p:spPr>
           <a:xfrm>
-            <a:off x="1995564" y="2869114"/>
+            <a:off x="2220564" y="3589114"/>
             <a:ext cx="594952" cy="805595"/>
           </a:xfrm>
           <a:prstGeom prst="rect">
@@ -10913,7 +11144,7 @@
         </p:nvSpPr>
         <p:spPr>
           <a:xfrm>
-            <a:off x="2008438" y="3733723"/>
+            <a:off x="2233438" y="4453723"/>
             <a:ext cx="594952" cy="805595"/>
           </a:xfrm>
           <a:prstGeom prst="rect">
@@ -10969,8 +11200,8 @@
         </p:nvSpPr>
         <p:spPr bwMode="auto">
           <a:xfrm>
-            <a:off x="246000" y="2124000"/>
-            <a:ext cx="1315782" cy="945000"/>
+            <a:off x="336000" y="2664000"/>
+            <a:ext cx="1450782" cy="1035000"/>
           </a:xfrm>
           <a:prstGeom prst="wedgeRoundRectCallout">
             <a:avLst>
@@ -11024,14 +11255,38 @@
               <a:spcBef>
                 <a:spcPts val="200"/>
               </a:spcBef>
+              <a:spcAft>
+                <a:spcPts val="200"/>
+              </a:spcAft>
             </a:pPr>
             <a:r>
-              <a:rPr lang="bg-BG" sz="2800" b="1" dirty="0">
+              <a:rPr lang="bg-BG" sz="3000" b="1" dirty="0">
                 <a:solidFill>
                   <a:srgbClr val="FFFFFF"/>
                 </a:solidFill>
               </a:rPr>
-              <a:t>Лява сума</a:t>
+              <a:t>Лява</a:t>
+            </a:r>
+          </a:p>
+          <a:p>
+            <a:pPr algn="ctr">
+              <a:lnSpc>
+                <a:spcPts val="2600"/>
+              </a:lnSpc>
+              <a:spcBef>
+                <a:spcPts val="200"/>
+              </a:spcBef>
+              <a:spcAft>
+                <a:spcPts val="200"/>
+              </a:spcAft>
+            </a:pPr>
+            <a:r>
+              <a:rPr lang="bg-BG" sz="3000" b="1" dirty="0">
+                <a:solidFill>
+                  <a:srgbClr val="FFFFFF"/>
+                </a:solidFill>
+              </a:rPr>
+              <a:t>сума</a:t>
             </a:r>
           </a:p>
         </p:txBody>
@@ -11052,8 +11307,8 @@
         </p:nvSpPr>
         <p:spPr bwMode="auto">
           <a:xfrm>
-            <a:off x="3050051" y="4239000"/>
-            <a:ext cx="1255472" cy="900000"/>
+            <a:off x="3275051" y="4849091"/>
+            <a:ext cx="1596380" cy="886691"/>
           </a:xfrm>
           <a:prstGeom prst="wedgeRoundRectCallout">
             <a:avLst>
@@ -11106,12 +11361,27 @@
               </a:lnSpc>
             </a:pPr>
             <a:r>
-              <a:rPr lang="bg-BG" sz="2800" b="1" dirty="0">
+              <a:rPr lang="bg-BG" sz="3000" b="1" dirty="0">
                 <a:solidFill>
                   <a:srgbClr val="FFFFFF"/>
                 </a:solidFill>
               </a:rPr>
-              <a:t>Дясна сума</a:t>
+              <a:t>Дясна</a:t>
+            </a:r>
+          </a:p>
+          <a:p>
+            <a:pPr algn="ctr">
+              <a:lnSpc>
+                <a:spcPts val="2600"/>
+              </a:lnSpc>
+            </a:pPr>
+            <a:r>
+              <a:rPr lang="bg-BG" sz="3000" b="1" dirty="0">
+                <a:solidFill>
+                  <a:srgbClr val="FFFFFF"/>
+                </a:solidFill>
+              </a:rPr>
+              <a:t>сума</a:t>
             </a:r>
           </a:p>
         </p:txBody>
@@ -11393,13 +11663,8 @@
           <a:p>
             <a:r>
               <a:rPr lang="bg-BG" noProof="1"/>
-              <a:t>Лява и дясна сума </a:t>
-            </a:r>
-            <a:r>
-              <a:rPr lang="bg-BG" dirty="0"/>
-              <a:t>– решение</a:t>
-            </a:r>
-            <a:endParaRPr lang="bg-BG" noProof="1"/>
+              <a:t>Решение: Лява и дясна сума</a:t>
+            </a:r>
           </a:p>
         </p:txBody>
       </p:sp>
@@ -11658,8 +11923,8 @@
         </p:nvSpPr>
         <p:spPr>
           <a:xfrm>
-            <a:off x="1199456" y="6323730"/>
-            <a:ext cx="9721080" cy="399981"/>
+            <a:off x="819212" y="6371227"/>
+            <a:ext cx="10553574" cy="399981"/>
           </a:xfrm>
           <a:prstGeom prst="rect">
             <a:avLst/>
@@ -11790,7 +12055,7 @@
               <a:rPr lang="en-US" sz="1999" dirty="0">
                 <a:hlinkClick r:id="rId3"/>
               </a:rPr>
-              <a:t>https://judge.softuni.bg/Contests/Practice/Index/3157#8</a:t>
+              <a:t>https://judge.softuni.org/Contests/Practice/Index/3899#2</a:t>
             </a:r>
             <a:endParaRPr lang="en-US" sz="1999" dirty="0">
               <a:solidFill>
@@ -12586,11 +12851,11 @@
           <a:p>
             <a:r>
               <a:rPr lang="bg-BG" noProof="1"/>
-              <a:t>Четна / нечетна сума – условие</a:t>
+              <a:t>Задача: Четна / нечетна сума </a:t>
             </a:r>
             <a:r>
               <a:rPr lang="en-US" noProof="1"/>
-              <a:t> (1)</a:t>
+              <a:t>(1)</a:t>
             </a:r>
             <a:endParaRPr lang="bg-BG" noProof="1"/>
           </a:p>
@@ -12900,11 +13165,11 @@
           <a:p>
             <a:r>
               <a:rPr lang="bg-BG" noProof="1"/>
-              <a:t>Четна / нечетна сума – условие</a:t>
+              <a:t>Задача: Четна / нечетна сума </a:t>
             </a:r>
             <a:r>
               <a:rPr lang="en-US" noProof="1"/>
-              <a:t> (2) </a:t>
+              <a:t>(2) </a:t>
             </a:r>
             <a:endParaRPr lang="bg-BG" noProof="1"/>
           </a:p>
@@ -12920,8 +13185,8 @@
         </p:nvSpPr>
         <p:spPr bwMode="auto">
           <a:xfrm>
-            <a:off x="742860" y="2440110"/>
-            <a:ext cx="761801" cy="2186899"/>
+            <a:off x="658502" y="2800453"/>
+            <a:ext cx="761134" cy="2428277"/>
           </a:xfrm>
           <a:prstGeom prst="rect">
             <a:avLst/>
@@ -13073,8 +13338,8 @@
         </p:nvSpPr>
         <p:spPr bwMode="auto">
           <a:xfrm>
-            <a:off x="2276466" y="2949785"/>
-            <a:ext cx="1774557" cy="958429"/>
+            <a:off x="2192108" y="3310128"/>
+            <a:ext cx="1773004" cy="1064215"/>
           </a:xfrm>
           <a:prstGeom prst="rect">
             <a:avLst/>
@@ -13168,8 +13433,8 @@
         </p:nvSpPr>
         <p:spPr>
           <a:xfrm>
-            <a:off x="1662023" y="3380794"/>
-            <a:ext cx="457081" cy="304721"/>
+            <a:off x="1577664" y="3741137"/>
+            <a:ext cx="456681" cy="338354"/>
           </a:xfrm>
           <a:prstGeom prst="rightArrow">
             <a:avLst/>
@@ -13210,8 +13475,8 @@
         </p:nvSpPr>
         <p:spPr bwMode="auto">
           <a:xfrm>
-            <a:off x="4572512" y="2438657"/>
-            <a:ext cx="743032" cy="2188997"/>
+            <a:off x="4488153" y="2799000"/>
+            <a:ext cx="742382" cy="2430606"/>
           </a:xfrm>
           <a:prstGeom prst="rect">
             <a:avLst/>
@@ -13368,8 +13633,8 @@
         </p:nvSpPr>
         <p:spPr bwMode="auto">
           <a:xfrm>
-            <a:off x="6103127" y="3053939"/>
-            <a:ext cx="1717145" cy="958429"/>
+            <a:off x="6018769" y="3414282"/>
+            <a:ext cx="1715642" cy="1064215"/>
           </a:xfrm>
           <a:prstGeom prst="rect">
             <a:avLst/>
@@ -13445,8 +13710,8 @@
         </p:nvSpPr>
         <p:spPr>
           <a:xfrm>
-            <a:off x="5478544" y="3380794"/>
-            <a:ext cx="457081" cy="304721"/>
+            <a:off x="5394185" y="3741137"/>
+            <a:ext cx="456681" cy="338354"/>
           </a:xfrm>
           <a:prstGeom prst="rightArrow">
             <a:avLst/>
@@ -13487,8 +13752,8 @@
         </p:nvSpPr>
         <p:spPr bwMode="auto">
           <a:xfrm>
-            <a:off x="8437053" y="2678343"/>
-            <a:ext cx="743032" cy="1709626"/>
+            <a:off x="8352694" y="3038685"/>
+            <a:ext cx="742382" cy="1898325"/>
           </a:xfrm>
           <a:prstGeom prst="rect">
             <a:avLst/>
@@ -13611,8 +13876,8 @@
         </p:nvSpPr>
         <p:spPr bwMode="auto">
           <a:xfrm>
-            <a:off x="9870358" y="2949785"/>
-            <a:ext cx="1717145" cy="958429"/>
+            <a:off x="9786000" y="3310128"/>
+            <a:ext cx="1715642" cy="1064215"/>
           </a:xfrm>
           <a:prstGeom prst="rect">
             <a:avLst/>
@@ -13688,8 +13953,8 @@
         </p:nvSpPr>
         <p:spPr>
           <a:xfrm>
-            <a:off x="9296681" y="3380792"/>
-            <a:ext cx="457081" cy="304721"/>
+            <a:off x="9212322" y="3741135"/>
+            <a:ext cx="456681" cy="338354"/>
           </a:xfrm>
           <a:prstGeom prst="rightArrow">
             <a:avLst/>
@@ -14053,13 +14318,8 @@
           <a:p>
             <a:r>
               <a:rPr lang="bg-BG" noProof="1"/>
-              <a:t>Четна / нечетна сума </a:t>
-            </a:r>
-            <a:r>
-              <a:rPr lang="bg-BG" dirty="0"/>
-              <a:t>– решение</a:t>
-            </a:r>
-            <a:endParaRPr lang="bg-BG" noProof="1"/>
+              <a:t>Решение: Четна / нечетна сума</a:t>
+            </a:r>
           </a:p>
         </p:txBody>
       </p:sp>
@@ -14322,7 +14582,7 @@
         </p:nvSpPr>
         <p:spPr>
           <a:xfrm>
-            <a:off x="1163452" y="6357269"/>
+            <a:off x="1163452" y="6391952"/>
             <a:ext cx="9865096" cy="399981"/>
           </a:xfrm>
           <a:prstGeom prst="rect">
@@ -14454,7 +14714,7 @@
               <a:rPr lang="en-US" sz="1999" dirty="0">
                 <a:hlinkClick r:id="rId3"/>
               </a:rPr>
-              <a:t>https://judge.softuni.bg/Contests/Practice/Index/3157#9</a:t>
+              <a:t>https://judge.softuni.org/Contests/Practice/Index/3899#3</a:t>
             </a:r>
             <a:endParaRPr lang="en-US" sz="1999" dirty="0">
               <a:solidFill>
@@ -15140,7 +15400,7 @@
           <a:p>
             <a:r>
               <a:rPr lang="bg-BG" dirty="0"/>
-              <a:t>Редица числа 2K+1 – условие</a:t>
+              <a:t>Задача: Редица числа 2K+1</a:t>
             </a:r>
           </a:p>
         </p:txBody>
@@ -17368,8 +17628,8 @@
           <a:lstStyle/>
           <a:p>
             <a:r>
-              <a:rPr lang="ru-RU"/>
-              <a:t>Редица числа 2K+1 – решение</a:t>
+              <a:rPr lang="ru-RU" dirty="0"/>
+              <a:t>Решение: Редица числа 2K+1</a:t>
             </a:r>
             <a:endParaRPr lang="en-US" dirty="0"/>
           </a:p>
@@ -17729,7 +17989,7 @@
         <p:spPr>
           <a:xfrm>
             <a:off x="507350" y="6291613"/>
-            <a:ext cx="11177301" cy="430775"/>
+            <a:ext cx="11177301" cy="400110"/>
           </a:xfrm>
           <a:prstGeom prst="rect">
             <a:avLst/>
@@ -17837,11 +18097,11 @@
           <a:p>
             <a:pPr algn="ctr"/>
             <a:r>
-              <a:rPr lang="bg-BG" sz="2199" dirty="0"/>
+              <a:rPr lang="bg-BG" sz="2000" dirty="0"/>
               <a:t>Тествайте</a:t>
             </a:r>
             <a:r>
-              <a:rPr lang="bg-BG" sz="2199" dirty="0">
+              <a:rPr lang="bg-BG" sz="2000" dirty="0">
                 <a:solidFill>
                   <a:prstClr val="white"/>
                 </a:solidFill>
@@ -17849,28 +18109,28 @@
               <a:t> </a:t>
             </a:r>
             <a:r>
-              <a:rPr lang="bg-BG" sz="2199" dirty="0"/>
+              <a:rPr lang="bg-BG" sz="2000" dirty="0"/>
               <a:t>решението</a:t>
             </a:r>
             <a:r>
-              <a:rPr lang="en-US" sz="2199" dirty="0"/>
+              <a:rPr lang="en-US" sz="2000" dirty="0"/>
               <a:t> </a:t>
             </a:r>
             <a:r>
-              <a:rPr lang="bg-BG" sz="2199" dirty="0"/>
+              <a:rPr lang="bg-BG" sz="2000" dirty="0"/>
               <a:t>си в </a:t>
             </a:r>
             <a:r>
-              <a:rPr lang="en-US" sz="2199" dirty="0"/>
+              <a:rPr lang="en-US" sz="2000" dirty="0"/>
               <a:t>Judge: </a:t>
             </a:r>
             <a:r>
-              <a:rPr lang="en-US" sz="2199" dirty="0">
+              <a:rPr lang="en-US" sz="2000" dirty="0">
                 <a:hlinkClick r:id="rId2"/>
               </a:rPr>
-              <a:t>https://judge.softuni.bg/Contests/Practice/Index/3157#14</a:t>
-            </a:r>
-            <a:endParaRPr lang="en-US" sz="2199" dirty="0">
+              <a:t>https://judge.softuni.org/Contests/Practice/Index/3899#5</a:t>
+            </a:r>
+            <a:endParaRPr lang="en-US" sz="2000" dirty="0">
               <a:solidFill>
                 <a:prstClr val="white"/>
               </a:solidFill>
@@ -18430,7 +18690,7 @@
           <a:p>
             <a:r>
               <a:rPr lang="bg-BG" dirty="0"/>
-              <a:t>Най-голямо число – условие</a:t>
+              <a:t>Задача: Най-голямо число</a:t>
             </a:r>
             <a:endParaRPr lang="en-US" dirty="0"/>
           </a:p>
@@ -18446,7 +18706,7 @@
         </p:nvSpPr>
         <p:spPr bwMode="auto">
           <a:xfrm>
-            <a:off x="4767873" y="4459932"/>
+            <a:off x="4768432" y="4566448"/>
             <a:ext cx="922781" cy="1804992"/>
           </a:xfrm>
           <a:prstGeom prst="rect">
@@ -18578,7 +18838,7 @@
         </p:nvSpPr>
         <p:spPr bwMode="auto">
           <a:xfrm>
-            <a:off x="6513442" y="5077317"/>
+            <a:off x="6514001" y="5183833"/>
             <a:ext cx="792173" cy="570226"/>
           </a:xfrm>
           <a:prstGeom prst="rect">
@@ -18633,7 +18893,7 @@
         </p:nvSpPr>
         <p:spPr>
           <a:xfrm>
-            <a:off x="5925695" y="5210069"/>
+            <a:off x="5926254" y="5316585"/>
             <a:ext cx="457081" cy="304721"/>
           </a:xfrm>
           <a:prstGeom prst="rightArrow">
@@ -18675,7 +18935,7 @@
         </p:nvSpPr>
         <p:spPr bwMode="auto">
           <a:xfrm>
-            <a:off x="1055441" y="4363179"/>
+            <a:off x="1056000" y="4469695"/>
             <a:ext cx="914161" cy="2022252"/>
           </a:xfrm>
           <a:prstGeom prst="rect">
@@ -18822,7 +19082,7 @@
         </p:nvSpPr>
         <p:spPr bwMode="auto">
           <a:xfrm>
-            <a:off x="2804595" y="5077317"/>
+            <a:off x="2805154" y="5183833"/>
             <a:ext cx="792173" cy="570226"/>
           </a:xfrm>
           <a:prstGeom prst="rect">
@@ -18877,7 +19137,7 @@
         </p:nvSpPr>
         <p:spPr>
           <a:xfrm>
-            <a:off x="2204643" y="5210069"/>
+            <a:off x="2205202" y="5316585"/>
             <a:ext cx="457081" cy="304721"/>
           </a:xfrm>
           <a:prstGeom prst="rightArrow">
@@ -18919,7 +19179,7 @@
         </p:nvSpPr>
         <p:spPr bwMode="auto">
           <a:xfrm>
-            <a:off x="8448350" y="4293096"/>
+            <a:off x="8448909" y="4399612"/>
             <a:ext cx="914161" cy="2092336"/>
           </a:xfrm>
           <a:prstGeom prst="rect">
@@ -19055,7 +19315,7 @@
         </p:nvSpPr>
         <p:spPr bwMode="auto">
           <a:xfrm>
-            <a:off x="10152871" y="5074327"/>
+            <a:off x="10153430" y="5180843"/>
             <a:ext cx="792173" cy="576202"/>
           </a:xfrm>
           <a:prstGeom prst="rect">
@@ -19110,7 +19370,7 @@
         </p:nvSpPr>
         <p:spPr>
           <a:xfrm>
-            <a:off x="9563996" y="5210069"/>
+            <a:off x="9564555" y="5316585"/>
             <a:ext cx="457081" cy="304721"/>
           </a:xfrm>
           <a:prstGeom prst="rightArrow">
@@ -19784,65 +20044,50 @@
           <a:lstStyle/>
           <a:p>
             <a:r>
+              <a:rPr lang="en-US" sz="3399" dirty="0">
+                <a:latin typeface="Consolas" panose="020B0609020204030204" pitchFamily="49" charset="0"/>
+                <a:cs typeface="Consolas" panose="020B0609020204030204" pitchFamily="49" charset="0"/>
+              </a:rPr>
+              <a:t>For-</a:t>
+            </a:r>
+            <a:r>
               <a:rPr lang="bg-BG" sz="3399" dirty="0">
                 <a:latin typeface="Calibri" panose="020F0502020204030204" pitchFamily="34" charset="0"/>
                 <a:cs typeface="Calibri" panose="020F0502020204030204" pitchFamily="34" charset="0"/>
               </a:rPr>
-              <a:t>По-сложни </a:t>
-            </a:r>
-            <a:r>
-              <a:rPr lang="en-US" sz="3399" b="1" dirty="0">
-                <a:solidFill>
-                  <a:schemeClr val="bg1"/>
-                </a:solidFill>
+              <a:t>цикли</a:t>
+            </a:r>
+            <a:endParaRPr lang="en-US" sz="3399" dirty="0">
+              <a:latin typeface="Calibri" panose="020F0502020204030204" pitchFamily="34" charset="0"/>
+              <a:cs typeface="Calibri" panose="020F0502020204030204" pitchFamily="34" charset="0"/>
+            </a:endParaRPr>
+          </a:p>
+          <a:p>
+            <a:pPr lvl="1"/>
+            <a:r>
+              <a:rPr lang="bg-BG" sz="3199" dirty="0">
+                <a:latin typeface="Calibri" panose="020F0502020204030204" pitchFamily="34" charset="0"/>
+                <a:cs typeface="Calibri" panose="020F0502020204030204" pitchFamily="34" charset="0"/>
+              </a:rPr>
+              <a:t>Цикли с обратна стъпка</a:t>
+            </a:r>
+          </a:p>
+          <a:p>
+            <a:r>
+              <a:rPr lang="en-US" sz="3399" dirty="0">
                 <a:latin typeface="Consolas" panose="020B0609020204030204" pitchFamily="49" charset="0"/>
                 <a:cs typeface="Consolas" panose="020B0609020204030204" pitchFamily="49" charset="0"/>
               </a:rPr>
-              <a:t>for-</a:t>
-            </a:r>
-            <a:r>
-              <a:rPr lang="bg-BG" sz="3399" b="1" dirty="0">
-                <a:solidFill>
-                  <a:schemeClr val="bg1"/>
-                </a:solidFill>
-                <a:latin typeface="Calibri" panose="020F0502020204030204" pitchFamily="34" charset="0"/>
-                <a:cs typeface="Calibri" panose="020F0502020204030204" pitchFamily="34" charset="0"/>
-              </a:rPr>
-              <a:t>цикли</a:t>
-            </a:r>
-          </a:p>
-          <a:p>
+              <a:t>While-</a:t>
+            </a:r>
             <a:r>
               <a:rPr lang="bg-BG" sz="3399" dirty="0">
                 <a:latin typeface="Calibri" panose="020F0502020204030204" pitchFamily="34" charset="0"/>
                 <a:cs typeface="Calibri" panose="020F0502020204030204" pitchFamily="34" charset="0"/>
               </a:rPr>
-              <a:t>По-сложни </a:t>
-            </a:r>
-            <a:r>
-              <a:rPr lang="en-US" sz="3399" b="1" dirty="0">
-                <a:solidFill>
-                  <a:schemeClr val="bg1"/>
-                </a:solidFill>
-                <a:latin typeface="Consolas" panose="020B0609020204030204" pitchFamily="49" charset="0"/>
-                <a:cs typeface="Consolas" panose="020B0609020204030204" pitchFamily="49" charset="0"/>
-              </a:rPr>
-              <a:t>while-</a:t>
-            </a:r>
-            <a:r>
-              <a:rPr lang="bg-BG" sz="3399" b="1" dirty="0">
-                <a:solidFill>
-                  <a:schemeClr val="bg1"/>
-                </a:solidFill>
-                <a:latin typeface="Calibri" panose="020F0502020204030204" pitchFamily="34" charset="0"/>
-                <a:cs typeface="Calibri" panose="020F0502020204030204" pitchFamily="34" charset="0"/>
-              </a:rPr>
               <a:t>цикли</a:t>
             </a:r>
-            <a:endParaRPr lang="en-US" sz="3399" b="1" dirty="0">
-              <a:solidFill>
-                <a:schemeClr val="bg1"/>
-              </a:solidFill>
+            <a:endParaRPr lang="en-US" sz="3399" dirty="0">
               <a:latin typeface="Calibri" panose="020F0502020204030204" pitchFamily="34" charset="0"/>
               <a:cs typeface="Calibri" panose="020F0502020204030204" pitchFamily="34" charset="0"/>
             </a:endParaRPr>
@@ -19853,25 +20098,25 @@
                 <a:latin typeface="Calibri" panose="020F0502020204030204" pitchFamily="34" charset="0"/>
                 <a:cs typeface="Calibri" panose="020F0502020204030204" pitchFamily="34" charset="0"/>
               </a:rPr>
-              <a:t>По-сложни </a:t>
-            </a:r>
-            <a:r>
-              <a:rPr lang="bg-BG" sz="3399" b="1" dirty="0">
-                <a:solidFill>
-                  <a:schemeClr val="bg1"/>
-                </a:solidFill>
+              <a:t>Вложени цикли</a:t>
+            </a:r>
+          </a:p>
+          <a:p>
+            <a:pPr lvl="1"/>
+            <a:r>
+              <a:rPr lang="bg-BG" sz="3199" dirty="0">
                 <a:latin typeface="Calibri" panose="020F0502020204030204" pitchFamily="34" charset="0"/>
                 <a:cs typeface="Calibri" panose="020F0502020204030204" pitchFamily="34" charset="0"/>
               </a:rPr>
-              <a:t>вложени цикли</a:t>
-            </a:r>
-            <a:endParaRPr lang="en-US" sz="3399" b="1" dirty="0">
-              <a:solidFill>
-                <a:schemeClr val="bg1"/>
-              </a:solidFill>
-              <a:latin typeface="Calibri" panose="020F0502020204030204" pitchFamily="34" charset="0"/>
-              <a:cs typeface="Calibri" panose="020F0502020204030204" pitchFamily="34" charset="0"/>
-            </a:endParaRPr>
+              <a:t>Прекъсване на вложени цикли – </a:t>
+            </a:r>
+            <a:r>
+              <a:rPr lang="en-US" sz="3199" dirty="0">
+                <a:latin typeface="Consolas" panose="020B0609020204030204" pitchFamily="49" charset="0"/>
+                <a:cs typeface="Consolas" panose="020B0609020204030204" pitchFamily="49" charset="0"/>
+              </a:rPr>
+              <a:t>break</a:t>
+            </a:r>
           </a:p>
           <a:p>
             <a:pPr marL="0" indent="0">
@@ -20208,6 +20453,104 @@
                       </p:childTnLst>
                     </p:cTn>
                   </p:par>
+                  <p:par>
+                    <p:cTn id="15" fill="hold">
+                      <p:stCondLst>
+                        <p:cond delay="indefinite"/>
+                      </p:stCondLst>
+                      <p:childTnLst>
+                        <p:par>
+                          <p:cTn id="16" fill="hold">
+                            <p:stCondLst>
+                              <p:cond delay="0"/>
+                            </p:stCondLst>
+                            <p:childTnLst>
+                              <p:par>
+                                <p:cTn id="17" presetID="1" presetClass="entr" presetSubtype="0" fill="hold" nodeType="clickEffect">
+                                  <p:stCondLst>
+                                    <p:cond delay="0"/>
+                                  </p:stCondLst>
+                                  <p:childTnLst>
+                                    <p:set>
+                                      <p:cBhvr>
+                                        <p:cTn id="18" dur="1" fill="hold">
+                                          <p:stCondLst>
+                                            <p:cond delay="0"/>
+                                          </p:stCondLst>
+                                        </p:cTn>
+                                        <p:tgtEl>
+                                          <p:spTgt spid="444419">
+                                            <p:txEl>
+                                              <p:pRg st="3" end="3"/>
+                                            </p:txEl>
+                                          </p:spTgt>
+                                        </p:tgtEl>
+                                        <p:attrNameLst>
+                                          <p:attrName>style.visibility</p:attrName>
+                                        </p:attrNameLst>
+                                      </p:cBhvr>
+                                      <p:to>
+                                        <p:strVal val="visible"/>
+                                      </p:to>
+                                    </p:set>
+                                  </p:childTnLst>
+                                </p:cTn>
+                              </p:par>
+                            </p:childTnLst>
+                          </p:cTn>
+                        </p:par>
+                      </p:childTnLst>
+                    </p:cTn>
+                  </p:par>
+                  <p:par>
+                    <p:cTn id="19" fill="hold">
+                      <p:stCondLst>
+                        <p:cond delay="indefinite"/>
+                      </p:stCondLst>
+                      <p:childTnLst>
+                        <p:par>
+                          <p:cTn id="20" fill="hold">
+                            <p:stCondLst>
+                              <p:cond delay="0"/>
+                            </p:stCondLst>
+                            <p:childTnLst>
+                              <p:par>
+                                <p:cTn id="21" presetID="1" presetClass="entr" presetSubtype="0" fill="hold" nodeType="clickEffect">
+                                  <p:stCondLst>
+                                    <p:cond delay="0"/>
+                                  </p:stCondLst>
+                                  <p:childTnLst>
+                                    <p:set>
+                                      <p:cBhvr>
+                                        <p:cTn id="22" dur="1" fill="hold">
+                                          <p:stCondLst>
+                                            <p:cond delay="0"/>
+                                          </p:stCondLst>
+                                        </p:cTn>
+                                        <p:tgtEl>
+                                          <p:spTgt spid="444419">
+                                            <p:txEl>
+                                              <p:pRg st="4" end="4"/>
+                                            </p:txEl>
+                                          </p:spTgt>
+                                        </p:tgtEl>
+                                        <p:attrNameLst>
+                                          <p:attrName>style.visibility</p:attrName>
+                                        </p:attrNameLst>
+                                      </p:cBhvr>
+                                      <p:to>
+                                        <p:strVal val="visible"/>
+                                      </p:to>
+                                    </p:set>
+                                  </p:childTnLst>
+                                </p:cTn>
+                              </p:par>
+                            </p:childTnLst>
+                          </p:cTn>
+                        </p:par>
+                      </p:childTnLst>
+                    </p:cTn>
+                  </p:par>
                 </p:childTnLst>
               </p:cTn>
               <p:prevCondLst>
@@ -20266,8 +20609,8 @@
           <a:lstStyle/>
           <a:p>
             <a:r>
-              <a:rPr lang="bg-BG"/>
-              <a:t>Най-голямо число – решение</a:t>
+              <a:rPr lang="bg-BG" dirty="0"/>
+              <a:t>Решение: Най-голямо число</a:t>
             </a:r>
             <a:endParaRPr lang="en-US" dirty="0"/>
           </a:p>
@@ -20496,8 +20839,8 @@
         </p:nvSpPr>
         <p:spPr>
           <a:xfrm>
-            <a:off x="507351" y="6294840"/>
-            <a:ext cx="11177301" cy="430775"/>
+            <a:off x="507349" y="6380821"/>
+            <a:ext cx="11177301" cy="400110"/>
           </a:xfrm>
           <a:prstGeom prst="rect">
             <a:avLst/>
@@ -20605,11 +20948,11 @@
           <a:p>
             <a:pPr algn="ctr"/>
             <a:r>
-              <a:rPr lang="bg-BG" sz="2199" dirty="0"/>
+              <a:rPr lang="bg-BG" sz="2000" dirty="0"/>
               <a:t>Тествайте</a:t>
             </a:r>
             <a:r>
-              <a:rPr lang="bg-BG" sz="2199" dirty="0">
+              <a:rPr lang="bg-BG" sz="2000" dirty="0">
                 <a:solidFill>
                   <a:prstClr val="white"/>
                 </a:solidFill>
@@ -20617,20 +20960,20 @@
               <a:t> </a:t>
             </a:r>
             <a:r>
-              <a:rPr lang="bg-BG" sz="2199" dirty="0"/>
+              <a:rPr lang="bg-BG" sz="2000" dirty="0"/>
               <a:t>решението си в </a:t>
             </a:r>
             <a:r>
-              <a:rPr lang="en-US" sz="2199" dirty="0"/>
+              <a:rPr lang="en-US" sz="2000" dirty="0"/>
               <a:t>Judge: </a:t>
             </a:r>
             <a:r>
-              <a:rPr lang="en-US" sz="2199" dirty="0">
+              <a:rPr lang="en-US" sz="2000" dirty="0">
                 <a:hlinkClick r:id="rId3"/>
               </a:rPr>
-              <a:t>https://judge.softuni.bg/Contests/Practice/Index/3157#16</a:t>
-            </a:r>
-            <a:endParaRPr lang="en-US" sz="2199" dirty="0">
+              <a:t>https://judge.softuni.org/Contests/Practice/Index/3899#6</a:t>
+            </a:r>
+            <a:endParaRPr lang="en-US" sz="2000" dirty="0">
               <a:solidFill>
                 <a:prstClr val="white"/>
               </a:solidFill>
@@ -21405,8 +21748,8 @@
           <a:lstStyle/>
           <a:p>
             <a:r>
-              <a:rPr lang="bg-BG"/>
-              <a:t>Най-малко число – условие</a:t>
+              <a:rPr lang="bg-BG" dirty="0"/>
+              <a:t>Задача: Най-малко число</a:t>
             </a:r>
             <a:endParaRPr lang="en-US" dirty="0"/>
           </a:p>
@@ -21422,7 +21765,7 @@
         </p:nvSpPr>
         <p:spPr bwMode="auto">
           <a:xfrm>
-            <a:off x="6450153" y="5199527"/>
+            <a:off x="6509601" y="5304568"/>
             <a:ext cx="788551" cy="491774"/>
           </a:xfrm>
           <a:prstGeom prst="rect">
@@ -21479,7 +21822,7 @@
         </p:nvSpPr>
         <p:spPr bwMode="auto">
           <a:xfrm>
-            <a:off x="2789885" y="5185313"/>
+            <a:off x="2848625" y="5304568"/>
             <a:ext cx="792173" cy="491774"/>
           </a:xfrm>
           <a:prstGeom prst="rect">
@@ -21534,7 +21877,7 @@
         </p:nvSpPr>
         <p:spPr>
           <a:xfrm>
-            <a:off x="2212424" y="5274301"/>
+            <a:off x="2212612" y="5355948"/>
             <a:ext cx="430775" cy="304721"/>
           </a:xfrm>
           <a:prstGeom prst="rightArrow">
@@ -21576,7 +21919,7 @@
         </p:nvSpPr>
         <p:spPr bwMode="auto">
           <a:xfrm>
-            <a:off x="10190812" y="5163526"/>
+            <a:off x="10299573" y="5245173"/>
             <a:ext cx="780719" cy="491775"/>
           </a:xfrm>
           <a:prstGeom prst="rect">
@@ -21631,7 +21974,7 @@
         </p:nvSpPr>
         <p:spPr>
           <a:xfrm>
-            <a:off x="9676469" y="5247602"/>
+            <a:off x="9676657" y="5329249"/>
             <a:ext cx="408673" cy="304721"/>
           </a:xfrm>
           <a:prstGeom prst="rightArrow">
@@ -21677,7 +22020,7 @@
         </p:nvSpPr>
         <p:spPr>
           <a:xfrm>
-            <a:off x="5918157" y="5293055"/>
+            <a:off x="5918345" y="5374702"/>
             <a:ext cx="400843" cy="304721"/>
           </a:xfrm>
           <a:prstGeom prst="rightArrow">
@@ -21797,7 +22140,7 @@
         </p:nvSpPr>
         <p:spPr bwMode="auto">
           <a:xfrm>
-            <a:off x="4803611" y="4527836"/>
+            <a:off x="4803799" y="4609483"/>
             <a:ext cx="922781" cy="1804992"/>
           </a:xfrm>
           <a:prstGeom prst="rect">
@@ -21935,7 +22278,7 @@
         </p:nvSpPr>
         <p:spPr bwMode="auto">
           <a:xfrm>
-            <a:off x="1091179" y="4431083"/>
+            <a:off x="1091367" y="4512730"/>
             <a:ext cx="914161" cy="2022252"/>
           </a:xfrm>
           <a:prstGeom prst="rect">
@@ -22088,7 +22431,7 @@
         </p:nvSpPr>
         <p:spPr bwMode="auto">
           <a:xfrm>
-            <a:off x="8484088" y="4361000"/>
+            <a:off x="8484276" y="4442647"/>
             <a:ext cx="914161" cy="2092336"/>
           </a:xfrm>
           <a:prstGeom prst="rect">
@@ -22728,8 +23071,8 @@
           <a:lstStyle/>
           <a:p>
             <a:r>
-              <a:rPr lang="bg-BG"/>
-              <a:t>Най-малко число – решение</a:t>
+              <a:rPr lang="bg-BG" dirty="0"/>
+              <a:t>Решение: Най-малко число</a:t>
             </a:r>
             <a:endParaRPr lang="en-US" dirty="0"/>
           </a:p>
@@ -22745,8 +23088,8 @@
         </p:nvSpPr>
         <p:spPr bwMode="auto">
           <a:xfrm>
-            <a:off x="2133305" y="1777852"/>
-            <a:ext cx="7925390" cy="3302296"/>
+            <a:off x="1640999" y="1839755"/>
+            <a:ext cx="8910000" cy="3539430"/>
           </a:xfrm>
           <a:prstGeom prst="rect">
             <a:avLst/>
@@ -22774,7 +23117,7 @@
           <a:lstStyle/>
           <a:p>
             <a:r>
-              <a:rPr lang="en-US" sz="2899" b="1" noProof="1">
+              <a:rPr lang="en-US" sz="3200" b="1" noProof="1">
                 <a:latin typeface="Consolas" pitchFamily="49" charset="0"/>
                 <a:cs typeface="Consolas" pitchFamily="49" charset="0"/>
               </a:rPr>
@@ -22783,14 +23126,14 @@
           </a:p>
           <a:p>
             <a:r>
-              <a:rPr lang="en-US" sz="2899" b="1" noProof="1">
+              <a:rPr lang="en-US" sz="3200" b="1" noProof="1">
                 <a:latin typeface="Consolas" pitchFamily="49" charset="0"/>
                 <a:cs typeface="Consolas" pitchFamily="49" charset="0"/>
               </a:rPr>
               <a:t>int min = int.</a:t>
             </a:r>
             <a:r>
-              <a:rPr lang="en-US" sz="2899" b="1" noProof="1">
+              <a:rPr lang="en-US" sz="3200" b="1" noProof="1">
                 <a:solidFill>
                   <a:schemeClr val="bg1"/>
                 </a:solidFill>
@@ -22800,7 +23143,7 @@
               <a:t>MaxValue</a:t>
             </a:r>
             <a:r>
-              <a:rPr lang="en-US" sz="2899" b="1" noProof="1">
+              <a:rPr lang="en-US" sz="3200" b="1" noProof="1">
                 <a:latin typeface="Consolas" pitchFamily="49" charset="0"/>
                 <a:cs typeface="Consolas" pitchFamily="49" charset="0"/>
               </a:rPr>
@@ -22809,7 +23152,7 @@
           </a:p>
           <a:p>
             <a:r>
-              <a:rPr lang="en-US" sz="2899" b="1" noProof="1">
+              <a:rPr lang="en-US" sz="3200" b="1" noProof="1">
                 <a:solidFill>
                   <a:schemeClr val="bg1"/>
                 </a:solidFill>
@@ -22819,7 +23162,7 @@
               <a:t>while</a:t>
             </a:r>
             <a:r>
-              <a:rPr lang="en-US" sz="2899" b="1" noProof="1">
+              <a:rPr lang="en-US" sz="3200" b="1" noProof="1">
                 <a:latin typeface="Consolas" pitchFamily="49" charset="0"/>
                 <a:cs typeface="Consolas" pitchFamily="49" charset="0"/>
               </a:rPr>
@@ -22828,7 +23171,7 @@
           </a:p>
           <a:p>
             <a:r>
-              <a:rPr lang="en-US" sz="2899" b="1" noProof="1">
+              <a:rPr lang="en-US" sz="3200" b="1" noProof="1">
                 <a:solidFill>
                   <a:schemeClr val="bg1"/>
                 </a:solidFill>
@@ -22840,7 +23183,7 @@
           </a:p>
           <a:p>
             <a:r>
-              <a:rPr lang="en-US" sz="2799" b="1" noProof="1">
+              <a:rPr lang="en-US" sz="3200" b="1" noProof="1">
                 <a:solidFill>
                   <a:schemeClr val="accent4"/>
                 </a:solidFill>
@@ -22850,7 +23193,7 @@
               <a:t>  </a:t>
             </a:r>
             <a:r>
-              <a:rPr lang="en-US" sz="2799" b="1" noProof="1">
+              <a:rPr lang="en-US" sz="3200" b="1" noProof="1">
                 <a:solidFill>
                   <a:schemeClr val="accent2"/>
                 </a:solidFill>
@@ -22860,7 +23203,7 @@
               <a:t>//TODO: </a:t>
             </a:r>
             <a:r>
-              <a:rPr lang="bg-BG" sz="2799" b="1" noProof="1">
+              <a:rPr lang="bg-BG" sz="3200" b="1" noProof="1">
                 <a:solidFill>
                   <a:schemeClr val="accent2"/>
                 </a:solidFill>
@@ -22870,7 +23213,7 @@
               <a:t>Използвайте логика,</a:t>
             </a:r>
             <a:br>
-              <a:rPr lang="bg-BG" sz="2799" b="1" noProof="1">
+              <a:rPr lang="bg-BG" sz="3200" b="1" noProof="1">
                 <a:solidFill>
                   <a:schemeClr val="accent2"/>
                 </a:solidFill>
@@ -22879,7 +23222,7 @@
               </a:rPr>
             </a:br>
             <a:r>
-              <a:rPr lang="bg-BG" sz="2799" b="1" noProof="1">
+              <a:rPr lang="bg-BG" sz="3200" b="1" noProof="1">
                 <a:solidFill>
                   <a:schemeClr val="accent2"/>
                 </a:solidFill>
@@ -22888,7 +23231,7 @@
               </a:rPr>
               <a:t>  подобна на тази от миналата задача</a:t>
             </a:r>
-            <a:endParaRPr lang="en-US" sz="2899" b="1" noProof="1">
+            <a:endParaRPr lang="en-US" sz="3200" b="1" noProof="1">
               <a:solidFill>
                 <a:schemeClr val="accent2"/>
               </a:solidFill>
@@ -22898,7 +23241,7 @@
           </a:p>
           <a:p>
             <a:r>
-              <a:rPr lang="en-US" sz="2899" b="1" noProof="1">
+              <a:rPr lang="en-US" sz="3200" b="1" noProof="1">
                 <a:solidFill>
                   <a:schemeClr val="bg1"/>
                 </a:solidFill>
@@ -22924,8 +23267,8 @@
         </p:nvSpPr>
         <p:spPr>
           <a:xfrm>
-            <a:off x="507349" y="6102325"/>
-            <a:ext cx="11177301" cy="430775"/>
+            <a:off x="507348" y="6255390"/>
+            <a:ext cx="11177301" cy="400110"/>
           </a:xfrm>
           <a:prstGeom prst="rect">
             <a:avLst/>
@@ -23033,11 +23376,11 @@
           <a:p>
             <a:pPr algn="ctr"/>
             <a:r>
-              <a:rPr lang="bg-BG" sz="2199" dirty="0"/>
+              <a:rPr lang="bg-BG" sz="2000" dirty="0"/>
               <a:t>Тествайте</a:t>
             </a:r>
             <a:r>
-              <a:rPr lang="bg-BG" sz="2199" dirty="0">
+              <a:rPr lang="bg-BG" sz="2000" dirty="0">
                 <a:solidFill>
                   <a:prstClr val="white"/>
                 </a:solidFill>
@@ -23045,20 +23388,20 @@
               <a:t> </a:t>
             </a:r>
             <a:r>
-              <a:rPr lang="bg-BG" sz="2199" dirty="0"/>
+              <a:rPr lang="bg-BG" sz="2000" dirty="0"/>
               <a:t>решението си в </a:t>
             </a:r>
             <a:r>
-              <a:rPr lang="en-US" sz="2199" dirty="0"/>
+              <a:rPr lang="en-US" sz="2000" dirty="0"/>
               <a:t>Judge: </a:t>
             </a:r>
             <a:r>
-              <a:rPr lang="en-US" sz="2199" dirty="0">
+              <a:rPr lang="en-US" sz="2000" dirty="0">
                 <a:hlinkClick r:id="rId3"/>
               </a:rPr>
-              <a:t>https://judge.softuni.bg/Contests/Practice/Index/3157#17</a:t>
-            </a:r>
-            <a:endParaRPr lang="en-US" sz="2199" dirty="0">
+              <a:t>https://judge.softuni.org/Contests/Practice/Index/3899#7</a:t>
+            </a:r>
+            <a:endParaRPr lang="en-US" sz="2000" dirty="0">
               <a:solidFill>
                 <a:prstClr val="white"/>
               </a:solidFill>
@@ -23647,11 +23990,11 @@
           <a:p>
             <a:r>
               <a:rPr lang="bg-BG" dirty="0"/>
-              <a:t>Баланс на сметка – условие</a:t>
+              <a:t>Задача: Баланс на сметка </a:t>
             </a:r>
             <a:r>
               <a:rPr lang="en-US" dirty="0"/>
-              <a:t> (1)</a:t>
+              <a:t>(1)</a:t>
             </a:r>
           </a:p>
         </p:txBody>
@@ -23954,7 +24297,7 @@
           <a:p>
             <a:r>
               <a:rPr lang="ru-RU" dirty="0"/>
-              <a:t>Баланс на сметка – условие(</a:t>
+              <a:t>Задача: Баланс на сметка (</a:t>
             </a:r>
             <a:r>
               <a:rPr lang="en-US" dirty="0"/>
@@ -26892,8 +27235,8 @@
           <a:lstStyle/>
           <a:p>
             <a:r>
-              <a:rPr lang="bg-BG"/>
-              <a:t>Баланс на сметка – решение</a:t>
+              <a:rPr lang="bg-BG" dirty="0"/>
+              <a:t>Решение: Баланс на сметка</a:t>
             </a:r>
             <a:endParaRPr lang="en-US" dirty="0"/>
           </a:p>
@@ -27180,8 +27523,8 @@
         </p:nvSpPr>
         <p:spPr>
           <a:xfrm>
-            <a:off x="88180" y="6276231"/>
-            <a:ext cx="12015640" cy="461537"/>
+            <a:off x="88180" y="6357140"/>
+            <a:ext cx="12015640" cy="400110"/>
           </a:xfrm>
           <a:prstGeom prst="rect">
             <a:avLst/>
@@ -27289,11 +27632,11 @@
           <a:p>
             <a:pPr algn="ctr"/>
             <a:r>
-              <a:rPr lang="bg-BG" sz="2399" dirty="0"/>
+              <a:rPr lang="bg-BG" sz="2000" dirty="0"/>
               <a:t>Тествайте</a:t>
             </a:r>
             <a:r>
-              <a:rPr lang="bg-BG" sz="2399" dirty="0">
+              <a:rPr lang="bg-BG" sz="2000" dirty="0">
                 <a:solidFill>
                   <a:prstClr val="white"/>
                 </a:solidFill>
@@ -27301,28 +27644,28 @@
               <a:t> </a:t>
             </a:r>
             <a:r>
-              <a:rPr lang="bg-BG" sz="2399" dirty="0"/>
+              <a:rPr lang="bg-BG" sz="2000" dirty="0"/>
               <a:t>решението</a:t>
             </a:r>
             <a:r>
-              <a:rPr lang="en-US" sz="2399" dirty="0"/>
+              <a:rPr lang="en-US" sz="2000" dirty="0"/>
               <a:t> </a:t>
             </a:r>
             <a:r>
-              <a:rPr lang="bg-BG" sz="2399" dirty="0"/>
+              <a:rPr lang="bg-BG" sz="2000" dirty="0"/>
               <a:t>си в </a:t>
             </a:r>
             <a:r>
-              <a:rPr lang="en-US" sz="2399" dirty="0"/>
+              <a:rPr lang="en-US" sz="2000" dirty="0"/>
               <a:t>Judge: </a:t>
             </a:r>
             <a:r>
-              <a:rPr lang="en-US" sz="2399" dirty="0">
+              <a:rPr lang="en-US" sz="2000" dirty="0">
                 <a:hlinkClick r:id="rId2"/>
               </a:rPr>
-              <a:t>https://judge.softuni.bg/Contests/Practice/Index/3157#15</a:t>
-            </a:r>
-            <a:endParaRPr lang="en-US" sz="2399" dirty="0">
+              <a:t>https://judge.softuni.org/Contests/Practice/Index/3899#8</a:t>
+            </a:r>
+            <a:endParaRPr lang="en-US" sz="2000" dirty="0">
               <a:solidFill>
                 <a:prstClr val="white"/>
               </a:solidFill>
@@ -28550,7 +28893,7 @@
           <a:p>
             <a:r>
               <a:rPr lang="bg-BG" dirty="0"/>
-              <a:t>Завършване – условие (1) </a:t>
+              <a:t>Задача: Завършване (1) </a:t>
             </a:r>
             <a:endParaRPr lang="en-US" dirty="0"/>
           </a:p>
@@ -29020,7 +29363,7 @@
           <a:p>
             <a:r>
               <a:rPr lang="bg-BG" dirty="0"/>
-              <a:t>Завършване – условие (2) </a:t>
+              <a:t>Задача: Завършване (2) </a:t>
             </a:r>
             <a:endParaRPr lang="en-US" dirty="0"/>
           </a:p>
@@ -29363,8 +29706,8 @@
           <a:lstStyle/>
           <a:p>
             <a:r>
-              <a:rPr lang="bg-BG"/>
-              <a:t>Завършване – условие (2)</a:t>
+              <a:rPr lang="bg-BG" dirty="0"/>
+              <a:t>Задача: Завършване (3)</a:t>
             </a:r>
             <a:endParaRPr lang="en-US" dirty="0"/>
           </a:p>
@@ -30142,10 +30485,13 @@
           <a:lstStyle/>
           <a:p>
             <a:r>
-              <a:rPr lang="en-US"/>
-              <a:t>Завършване – решение </a:t>
-            </a:r>
-            <a:endParaRPr lang="en-US" dirty="0"/>
+              <a:rPr lang="bg-BG" dirty="0"/>
+              <a:t>Решение: </a:t>
+            </a:r>
+            <a:r>
+              <a:rPr lang="en-US" dirty="0"/>
+              <a:t>Завършване </a:t>
+            </a:r>
           </a:p>
         </p:txBody>
       </p:sp>
@@ -30599,7 +30945,7 @@
           <p:nvPr/>
         </p:nvPicPr>
         <p:blipFill>
-          <a:blip r:embed="rId2" cstate="print">
+          <a:blip r:embed="rId3" cstate="print">
             <a:duotone>
               <a:schemeClr val="accent5">
                 <a:shade val="45000"/>
@@ -30652,7 +30998,7 @@
         </p:nvSpPr>
         <p:spPr>
           <a:xfrm>
-            <a:off x="974588" y="6381329"/>
+            <a:off x="800455" y="6437037"/>
             <a:ext cx="10242824" cy="399981"/>
           </a:xfrm>
           <a:prstGeom prst="rect">
@@ -30782,9 +31128,9 @@
             </a:r>
             <a:r>
               <a:rPr lang="en-US" sz="1999" dirty="0">
-                <a:hlinkClick r:id="rId3"/>
-              </a:rPr>
-              <a:t>https://judge.softuni.bg/Contests/Practice/Index/3157#18</a:t>
+                <a:hlinkClick r:id="rId4"/>
+              </a:rPr>
+              <a:t>https://judge.softuni.org/Contests/Practice/Index/3899#9</a:t>
             </a:r>
             <a:endParaRPr lang="en-US" sz="1999" dirty="0">
               <a:solidFill>
@@ -31537,7 +31883,7 @@
           <a:p>
             <a:r>
               <a:rPr lang="bg-BG" dirty="0"/>
-              <a:t>Преместване – условие (1)</a:t>
+              <a:t>Задача: Преместване (1)</a:t>
             </a:r>
           </a:p>
         </p:txBody>
@@ -32389,7 +32735,7 @@
           <a:p>
             <a:r>
               <a:rPr lang="bg-BG" dirty="0"/>
-              <a:t>Преместване – условие (2)</a:t>
+              <a:t>Задача: Преместване (2)</a:t>
             </a:r>
           </a:p>
         </p:txBody>
@@ -32696,7 +33042,7 @@
           <a:p>
             <a:r>
               <a:rPr lang="bg-BG" dirty="0"/>
-              <a:t>Преместване – условие (3)</a:t>
+              <a:t>Задача: Преместване (3)</a:t>
             </a:r>
           </a:p>
         </p:txBody>
@@ -33414,7 +33760,7 @@
           <a:p>
             <a:r>
               <a:rPr lang="bg-BG" dirty="0"/>
-              <a:t>Преместване – решение (1)</a:t>
+              <a:t>Решение: Преместване (1)</a:t>
             </a:r>
             <a:endParaRPr lang="en-US" dirty="0"/>
           </a:p>
@@ -34201,7 +34547,7 @@
           <a:p>
             <a:r>
               <a:rPr lang="bg-BG" dirty="0"/>
-              <a:t>Преместване – решение (2)</a:t>
+              <a:t>Решение: Преместване (2)</a:t>
             </a:r>
             <a:endParaRPr lang="en-US" dirty="0"/>
           </a:p>
@@ -34853,7 +35199,7 @@
               <a:rPr lang="en-US" sz="1999" dirty="0">
                 <a:hlinkClick r:id="rId2"/>
               </a:rPr>
-              <a:t>https://judge.softuni.bg/Contests/Practice/Index/3157#19</a:t>
+              <a:t>https://judge.softuni.org/Contests/Practice/Index/3899#10</a:t>
             </a:r>
             <a:endParaRPr lang="en-US" sz="1999" dirty="0">
               <a:solidFill>
@@ -36244,11 +36590,11 @@
           <a:p>
             <a:r>
               <a:rPr lang="bg-BG" dirty="0"/>
-              <a:t>Сума от две числа – условие</a:t>
+              <a:t>Задача: Сума от две числа </a:t>
             </a:r>
             <a:r>
               <a:rPr lang="en-US" dirty="0"/>
-              <a:t> (1) </a:t>
+              <a:t>(1) </a:t>
             </a:r>
             <a:endParaRPr lang="bg-BG" dirty="0"/>
           </a:p>
@@ -36713,7 +37059,7 @@
           <a:p>
             <a:r>
               <a:rPr lang="bg-BG" dirty="0"/>
-              <a:t>Четни степени на 2 – условие</a:t>
+              <a:t>Задача: Четни степени на 2</a:t>
             </a:r>
             <a:r>
               <a:rPr lang="en-US" dirty="0"/>
@@ -36822,7 +37168,7 @@
           <a:lstStyle/>
           <a:p>
             <a:pPr algn="ctr"/>
-            <a:endParaRPr lang="en-US" sz="2799"/>
+            <a:endParaRPr lang="en-US" sz="2799" dirty="0"/>
           </a:p>
         </p:txBody>
       </p:sp>
@@ -36990,7 +37336,7 @@
           <a:lstStyle/>
           <a:p>
             <a:pPr algn="ctr"/>
-            <a:endParaRPr lang="en-US" sz="2799"/>
+            <a:endParaRPr lang="en-US" sz="2799" dirty="0"/>
           </a:p>
         </p:txBody>
       </p:sp>
@@ -37495,11 +37841,11 @@
           <a:p>
             <a:r>
               <a:rPr lang="bg-BG" dirty="0"/>
-              <a:t>Сума от две числа – условие</a:t>
+              <a:t>Задача: Сума от две числа </a:t>
             </a:r>
             <a:r>
               <a:rPr lang="en-US" dirty="0"/>
-              <a:t> (2) </a:t>
+              <a:t>(2) </a:t>
             </a:r>
             <a:endParaRPr lang="bg-BG" dirty="0"/>
           </a:p>
@@ -37615,7 +37961,7 @@
         </p:nvSpPr>
         <p:spPr>
           <a:xfrm>
-            <a:off x="3224835" y="4483341"/>
+            <a:off x="3224835" y="5056038"/>
             <a:ext cx="358663" cy="289485"/>
           </a:xfrm>
           <a:prstGeom prst="rightArrow">
@@ -37657,7 +38003,7 @@
         </p:nvSpPr>
         <p:spPr bwMode="auto">
           <a:xfrm>
-            <a:off x="3865825" y="4366596"/>
+            <a:off x="3865825" y="4939293"/>
             <a:ext cx="5910502" cy="503790"/>
           </a:xfrm>
           <a:prstGeom prst="rect">
@@ -37719,7 +38065,7 @@
         </p:nvSpPr>
         <p:spPr bwMode="auto">
           <a:xfrm>
-            <a:off x="2415675" y="3923530"/>
+            <a:off x="2415675" y="4496227"/>
             <a:ext cx="580621" cy="1389955"/>
           </a:xfrm>
           <a:prstGeom prst="rect">
@@ -38093,8 +38439,8 @@
           <a:lstStyle/>
           <a:p>
             <a:r>
-              <a:rPr lang="ru-RU"/>
-              <a:t>Сума от две числа – решение</a:t>
+              <a:rPr lang="ru-RU" dirty="0"/>
+              <a:t>Решение: Сума от две числа</a:t>
             </a:r>
             <a:endParaRPr lang="bg-BG" dirty="0"/>
           </a:p>
@@ -38253,21 +38599,7 @@
                 <a:latin typeface="Consolas" pitchFamily="49" charset="0"/>
                 <a:cs typeface="Consolas" pitchFamily="49" charset="0"/>
               </a:rPr>
-              <a:t>    for (int j = startingNumber; j &lt;= finalNumber; </a:t>
-            </a:r>
-            <a:r>
-              <a:rPr lang="en-US" sz="2200" b="1" dirty="0" err="1">
-                <a:latin typeface="Consolas" pitchFamily="49" charset="0"/>
-                <a:cs typeface="Consolas" pitchFamily="49" charset="0"/>
-              </a:rPr>
-              <a:t>j++</a:t>
-            </a:r>
-            <a:r>
-              <a:rPr lang="en-US" sz="2200" b="1" dirty="0">
-                <a:latin typeface="Consolas" pitchFamily="49" charset="0"/>
-                <a:cs typeface="Consolas" pitchFamily="49" charset="0"/>
-              </a:rPr>
-              <a:t>)</a:t>
+              <a:t>    for (int j = startingNumber; j &lt;= finalNumber; j++)</a:t>
             </a:r>
           </a:p>
           <a:p>
@@ -38485,7 +38817,7 @@
           <a:lstStyle/>
           <a:p>
             <a:pPr algn="ctr"/>
-            <a:endParaRPr lang="bg-BG" sz="2799"/>
+            <a:endParaRPr lang="bg-BG" sz="2799" dirty="0"/>
           </a:p>
         </p:txBody>
       </p:sp>
@@ -38560,7 +38892,26 @@
                   <a:schemeClr val="bg2"/>
                 </a:solidFill>
               </a:rPr>
-              <a:t>Ако намерим комбинация, прекъсваме вътрешния цикъл</a:t>
+              <a:t>Ако намерим комбинация, </a:t>
+            </a:r>
+            <a:r>
+              <a:rPr lang="bg-BG" sz="1999" b="1" dirty="0">
+                <a:solidFill>
+                  <a:schemeClr val="bg1">
+                    <a:lumMod val="60000"/>
+                    <a:lumOff val="40000"/>
+                  </a:schemeClr>
+                </a:solidFill>
+              </a:rPr>
+              <a:t>прекъсваме</a:t>
+            </a:r>
+            <a:r>
+              <a:rPr lang="bg-BG" sz="1999" b="1" dirty="0">
+                <a:solidFill>
+                  <a:schemeClr val="bg2"/>
+                </a:solidFill>
+              </a:rPr>
+              <a:t> вътрешния цикъл</a:t>
             </a:r>
           </a:p>
         </p:txBody>
@@ -38579,8 +38930,8 @@
         </p:nvSpPr>
         <p:spPr>
           <a:xfrm>
-            <a:off x="507351" y="6401621"/>
-            <a:ext cx="11177301" cy="430775"/>
+            <a:off x="507351" y="6376223"/>
+            <a:ext cx="11177301" cy="400110"/>
           </a:xfrm>
           <a:prstGeom prst="rect">
             <a:avLst/>
@@ -38688,11 +39039,11 @@
           <a:p>
             <a:pPr algn="ctr"/>
             <a:r>
-              <a:rPr lang="bg-BG" sz="2199" dirty="0"/>
+              <a:rPr lang="bg-BG" sz="2000" dirty="0"/>
               <a:t>Тествайте</a:t>
             </a:r>
             <a:r>
-              <a:rPr lang="bg-BG" sz="2199" dirty="0">
+              <a:rPr lang="bg-BG" sz="2000" dirty="0">
                 <a:solidFill>
                   <a:prstClr val="white"/>
                 </a:solidFill>
@@ -38700,20 +39051,20 @@
               <a:t> </a:t>
             </a:r>
             <a:r>
-              <a:rPr lang="bg-BG" sz="2199" dirty="0"/>
+              <a:rPr lang="bg-BG" sz="2000" dirty="0"/>
               <a:t>решението си в </a:t>
             </a:r>
             <a:r>
-              <a:rPr lang="en-US" sz="2199" dirty="0"/>
+              <a:rPr lang="en-US" sz="2000" dirty="0"/>
               <a:t>Judge: </a:t>
             </a:r>
             <a:r>
-              <a:rPr lang="en-US" sz="2199" dirty="0">
+              <a:rPr lang="en-US" sz="2000" dirty="0">
                 <a:hlinkClick r:id="rId2"/>
               </a:rPr>
-              <a:t>https://judge.softuni.bg/Contests/Practice/Index/3157#23</a:t>
-            </a:r>
-            <a:endParaRPr lang="en-US" sz="2199" dirty="0">
+              <a:t>https://judge.softuni.org/Contests/Practice/Index/3899#11</a:t>
+            </a:r>
+            <a:endParaRPr lang="en-US" sz="2000" dirty="0">
               <a:solidFill>
                 <a:prstClr val="white"/>
               </a:solidFill>
@@ -39565,11 +39916,11 @@
           <a:p>
             <a:r>
               <a:rPr lang="bg-BG" dirty="0"/>
-              <a:t>Сграда – условие</a:t>
+              <a:t>Задача: Сграда </a:t>
             </a:r>
             <a:r>
               <a:rPr lang="en-US" dirty="0"/>
-              <a:t> (1) </a:t>
+              <a:t>(1) </a:t>
             </a:r>
             <a:endParaRPr lang="bg-BG" dirty="0"/>
           </a:p>
@@ -40225,12 +40576,12 @@
           <a:lstStyle/>
           <a:p>
             <a:r>
-              <a:rPr lang="bg-BG"/>
-              <a:t>Сграда – условие</a:t>
-            </a:r>
-            <a:r>
-              <a:rPr lang="en-US"/>
-              <a:t> (2) </a:t>
+              <a:rPr lang="bg-BG" dirty="0"/>
+              <a:t>Задача: Сграда </a:t>
+            </a:r>
+            <a:r>
+              <a:rPr lang="en-US" dirty="0"/>
+              <a:t>(2) </a:t>
             </a:r>
             <a:endParaRPr lang="bg-BG" dirty="0"/>
           </a:p>
@@ -41246,10 +41597,9 @@
           <a:lstStyle/>
           <a:p>
             <a:r>
-              <a:rPr lang="bg-BG"/>
-              <a:t>Сграда – решение</a:t>
-            </a:r>
-            <a:endParaRPr lang="bg-BG" dirty="0"/>
+              <a:rPr lang="bg-BG" dirty="0"/>
+              <a:t>Решение: Сграда</a:t>
+            </a:r>
           </a:p>
         </p:txBody>
       </p:sp>
@@ -41654,7 +42004,7 @@
           <a:lstStyle/>
           <a:p>
             <a:pPr algn="ctr"/>
-            <a:endParaRPr lang="bg-BG" sz="2799"/>
+            <a:endParaRPr lang="bg-BG" sz="2799" dirty="0"/>
           </a:p>
         </p:txBody>
       </p:sp>
@@ -41742,8 +42092,8 @@
         </p:nvSpPr>
         <p:spPr>
           <a:xfrm>
-            <a:off x="586217" y="6402077"/>
-            <a:ext cx="11177301" cy="430775"/>
+            <a:off x="507349" y="6357140"/>
+            <a:ext cx="11177301" cy="400110"/>
           </a:xfrm>
           <a:prstGeom prst="rect">
             <a:avLst/>
@@ -41851,11 +42201,11 @@
           <a:p>
             <a:pPr algn="ctr"/>
             <a:r>
-              <a:rPr lang="bg-BG" sz="2199" dirty="0"/>
+              <a:rPr lang="bg-BG" sz="2000" dirty="0"/>
               <a:t>Тествайте</a:t>
             </a:r>
             <a:r>
-              <a:rPr lang="bg-BG" sz="2199" dirty="0">
+              <a:rPr lang="bg-BG" sz="2000" dirty="0">
                 <a:solidFill>
                   <a:prstClr val="white"/>
                 </a:solidFill>
@@ -41863,20 +42213,20 @@
               <a:t> </a:t>
             </a:r>
             <a:r>
-              <a:rPr lang="bg-BG" sz="2199" dirty="0"/>
+              <a:rPr lang="bg-BG" sz="2000" dirty="0"/>
               <a:t>решението си в </a:t>
             </a:r>
             <a:r>
-              <a:rPr lang="en-US" sz="2199" dirty="0"/>
+              <a:rPr lang="en-US" sz="2000" dirty="0"/>
               <a:t>Judge: </a:t>
             </a:r>
             <a:r>
-              <a:rPr lang="en-US" sz="2199" dirty="0">
+              <a:rPr lang="en-US" sz="2000" dirty="0">
                 <a:hlinkClick r:id="rId2"/>
               </a:rPr>
-              <a:t>https://judge.softuni.bg/Contests/Practice/Index/3157#25</a:t>
-            </a:r>
-            <a:endParaRPr lang="en-US" sz="2199" dirty="0">
+              <a:t>https://judge.softuni.org/Contests/Practice/Index/3899#12</a:t>
+            </a:r>
+            <a:endParaRPr lang="en-US" sz="2000" dirty="0">
               <a:solidFill>
                 <a:prstClr val="white"/>
               </a:solidFill>
@@ -42486,7 +42836,12 @@
             <p:ph type="body" sz="quarter" idx="10"/>
           </p:nvPr>
         </p:nvSpPr>
-        <p:spPr/>
+        <p:spPr>
+          <a:xfrm>
+            <a:off x="190402" y="1179000"/>
+            <a:ext cx="11818096" cy="5528766"/>
+          </a:xfrm>
+        </p:spPr>
         <p:txBody>
           <a:bodyPr/>
           <a:lstStyle>
@@ -42604,7 +42959,7 @@
         </p:nvGrpSpPr>
         <p:grpSpPr>
           <a:xfrm>
-            <a:off x="304342" y="1298394"/>
+            <a:off x="304342" y="1269000"/>
             <a:ext cx="11583316" cy="5298959"/>
             <a:chOff x="472011" y="1508786"/>
             <a:chExt cx="3799787" cy="4865561"/>
@@ -42716,7 +43071,7 @@
             <a:lstStyle/>
             <a:p>
               <a:pPr algn="ctr"/>
-              <a:endParaRPr lang="ko-KR" altLang="en-US" sz="2398">
+              <a:endParaRPr lang="ko-KR" altLang="en-US" sz="2398" dirty="0">
                 <a:solidFill>
                   <a:schemeClr val="bg1"/>
                 </a:solidFill>
@@ -42777,7 +43132,7 @@
             <a:lstStyle/>
             <a:p>
               <a:pPr algn="ctr"/>
-              <a:endParaRPr lang="ko-KR" altLang="en-US" sz="2398">
+              <a:endParaRPr lang="ko-KR" altLang="en-US" sz="2398" dirty="0">
                 <a:solidFill>
                   <a:schemeClr val="tx1"/>
                 </a:solidFill>
@@ -43033,14 +43388,42 @@
               </a:rPr>
               <a:t>цикли</a:t>
             </a:r>
-            <a:endParaRPr lang="bg-BG" sz="3600" dirty="0">
+            <a:endParaRPr lang="en-US" sz="3600" b="1" dirty="0">
               <a:solidFill>
                 <a:schemeClr val="accent1">
                   <a:lumMod val="60000"/>
                   <a:lumOff val="40000"/>
                 </a:schemeClr>
               </a:solidFill>
+              <a:latin typeface="Calibri" panose="020F0502020204030204" pitchFamily="34" charset="0"/>
+              <a:cs typeface="Calibri" panose="020F0502020204030204" pitchFamily="34" charset="0"/>
             </a:endParaRPr>
+          </a:p>
+          <a:p>
+            <a:pPr marL="989494" lvl="1" indent="-456428" latinLnBrk="0">
+              <a:lnSpc>
+                <a:spcPct val="100000"/>
+              </a:lnSpc>
+            </a:pPr>
+            <a:r>
+              <a:rPr lang="bg-BG" sz="3600" dirty="0">
+                <a:solidFill>
+                  <a:schemeClr val="bg2"/>
+                </a:solidFill>
+              </a:rPr>
+              <a:t>Цикли с </a:t>
+            </a:r>
+            <a:r>
+              <a:rPr lang="bg-BG" sz="3600" b="1" dirty="0">
+                <a:solidFill>
+                  <a:schemeClr val="bg1">
+                    <a:lumMod val="60000"/>
+                    <a:lumOff val="40000"/>
+                  </a:schemeClr>
+                </a:solidFill>
+              </a:rPr>
+              <a:t>обратна стъпка</a:t>
+            </a:r>
           </a:p>
           <a:p>
             <a:pPr marL="456428" indent="-456428" latinLnBrk="0">
@@ -43130,26 +43513,43 @@
               </a:rPr>
               <a:t>вложени цикли</a:t>
             </a:r>
+          </a:p>
+          <a:p>
+            <a:pPr marL="989494" lvl="1" indent="-456428" latinLnBrk="0">
+              <a:lnSpc>
+                <a:spcPct val="100000"/>
+              </a:lnSpc>
+            </a:pPr>
             <a:r>
               <a:rPr lang="bg-BG" sz="3600" dirty="0">
                 <a:solidFill>
-                  <a:schemeClr val="accent1">
+                  <a:schemeClr val="bg2"/>
+                </a:solidFill>
+              </a:rPr>
+              <a:t>Прекъсване на вложени цикли - </a:t>
+            </a:r>
+            <a:r>
+              <a:rPr lang="en-US" sz="3600" b="1" dirty="0">
+                <a:solidFill>
+                  <a:schemeClr val="bg1">
                     <a:lumMod val="60000"/>
                     <a:lumOff val="40000"/>
                   </a:schemeClr>
                 </a:solidFill>
-              </a:rPr>
-              <a:t>  </a:t>
-            </a:r>
-            <a:endParaRPr lang="bg-BG" sz="3600" dirty="0">
+                <a:latin typeface="Consolas" panose="020B0609020204030204" pitchFamily="49" charset="0"/>
+                <a:cs typeface="Consolas" panose="020B0609020204030204" pitchFamily="49" charset="0"/>
+              </a:rPr>
+              <a:t>break</a:t>
+            </a:r>
+            <a:endParaRPr lang="bg-BG" sz="3600" b="1" dirty="0">
               <a:solidFill>
-                <a:schemeClr val="accent1">
+                <a:schemeClr val="bg1">
                   <a:lumMod val="60000"/>
                   <a:lumOff val="40000"/>
                 </a:schemeClr>
               </a:solidFill>
-              <a:latin typeface="Calibri" panose="020F0502020204030204" pitchFamily="34" charset="0"/>
-              <a:cs typeface="Calibri" panose="020F0502020204030204" pitchFamily="34" charset="0"/>
+              <a:latin typeface="Consolas" panose="020B0609020204030204" pitchFamily="49" charset="0"/>
+              <a:cs typeface="Consolas" panose="020B0609020204030204" pitchFamily="49" charset="0"/>
             </a:endParaRPr>
           </a:p>
           <a:p>
@@ -43262,7 +43662,7 @@
                                         <p:tgtEl>
                                           <p:spTgt spid="15">
                                             <p:txEl>
-                                              <p:pRg st="1" end="1"/>
+                                              <p:pRg st="2" end="2"/>
                                             </p:txEl>
                                           </p:spTgt>
                                         </p:tgtEl>
@@ -43311,7 +43711,56 @@
                                         <p:tgtEl>
                                           <p:spTgt spid="15">
                                             <p:txEl>
-                                              <p:pRg st="2" end="2"/>
+                                              <p:pRg st="3" end="3"/>
+                                            </p:txEl>
+                                          </p:spTgt>
+                                        </p:tgtEl>
+                                        <p:attrNameLst>
+                                          <p:attrName>style.visibility</p:attrName>
+                                        </p:attrNameLst>
+                                      </p:cBhvr>
+                                      <p:to>
+                                        <p:strVal val="visible"/>
+                                      </p:to>
+                                    </p:set>
+                                  </p:childTnLst>
+                                </p:cTn>
+                              </p:par>
+                            </p:childTnLst>
+                          </p:cTn>
+                        </p:par>
+                      </p:childTnLst>
+                    </p:cTn>
+                  </p:par>
+                  <p:par>
+                    <p:cTn id="11" fill="hold">
+                      <p:stCondLst>
+                        <p:cond delay="indefinite"/>
+                      </p:stCondLst>
+                      <p:childTnLst>
+                        <p:par>
+                          <p:cTn id="12" fill="hold">
+                            <p:stCondLst>
+                              <p:cond delay="0"/>
+                            </p:stCondLst>
+                            <p:childTnLst>
+                              <p:par>
+                                <p:cTn id="13" presetID="1" presetClass="entr" presetSubtype="0" fill="hold" nodeType="clickEffect">
+                                  <p:stCondLst>
+                                    <p:cond delay="0"/>
+                                  </p:stCondLst>
+                                  <p:childTnLst>
+                                    <p:set>
+                                      <p:cBhvr>
+                                        <p:cTn id="14" dur="1" fill="hold">
+                                          <p:stCondLst>
+                                            <p:cond delay="0"/>
+                                          </p:stCondLst>
+                                        </p:cTn>
+                                        <p:tgtEl>
+                                          <p:spTgt spid="15">
+                                            <p:txEl>
+                                              <p:pRg st="4" end="4"/>
                                             </p:txEl>
                                           </p:spTgt>
                                         </p:tgtEl>
@@ -44087,7 +44536,7 @@
         </p:nvSpPr>
         <p:spPr bwMode="auto">
           <a:xfrm>
-            <a:off x="1487101" y="1490021"/>
+            <a:off x="1429049" y="1674000"/>
             <a:ext cx="9333900" cy="4185826"/>
           </a:xfrm>
           <a:prstGeom prst="rect">
@@ -44290,7 +44739,7 @@
         </p:nvSpPr>
         <p:spPr>
           <a:xfrm flipV="1">
-            <a:off x="6933984" y="2770804"/>
+            <a:off x="6861000" y="2968864"/>
             <a:ext cx="1388405" cy="457081"/>
           </a:xfrm>
           <a:prstGeom prst="rect">
@@ -44324,7 +44773,7 @@
           <a:lstStyle/>
           <a:p>
             <a:pPr algn="ctr"/>
-            <a:endParaRPr lang="en-US" sz="2799">
+            <a:endParaRPr lang="en-US" sz="2799" dirty="0">
               <a:solidFill>
                 <a:schemeClr val="bg1"/>
               </a:solidFill>
@@ -44349,7 +44798,7 @@
           <a:p>
             <a:r>
               <a:rPr lang="bg-BG" dirty="0"/>
-              <a:t>Четни степени на 2 – решение</a:t>
+              <a:t>Решение: Четни степени на 2</a:t>
             </a:r>
             <a:r>
               <a:rPr lang="en-US" dirty="0"/>
@@ -44442,7 +44891,7 @@
         </p:nvSpPr>
         <p:spPr>
           <a:xfrm>
-            <a:off x="1001271" y="6256369"/>
+            <a:off x="943219" y="6218175"/>
             <a:ext cx="10305559" cy="399981"/>
           </a:xfrm>
           <a:prstGeom prst="rect">
@@ -44574,7 +45023,7 @@
               <a:rPr lang="en-US" sz="1999" dirty="0">
                 <a:hlinkClick r:id="rId2"/>
               </a:rPr>
-              <a:t>https://judge.softuni.bg/Contests/Practice/Index/3157#3</a:t>
+              <a:t>https://judge.softuni.org/Contests/Practice/Index/3899#0</a:t>
             </a:r>
             <a:endParaRPr lang="en-US" sz="1999" dirty="0">
               <a:solidFill>
@@ -45071,8 +45520,8 @@
           <a:lstStyle/>
           <a:p>
             <a:r>
-              <a:rPr lang="bg-BG"/>
-              <a:t>Редица цели числа – условие</a:t>
+              <a:rPr lang="bg-BG" dirty="0"/>
+              <a:t>Задача: Редица цели числа</a:t>
             </a:r>
             <a:endParaRPr lang="en-US" dirty="0"/>
           </a:p>
@@ -45092,10 +45541,10 @@
         </p:nvGrpSpPr>
         <p:grpSpPr>
           <a:xfrm>
-            <a:off x="6168008" y="3925521"/>
-            <a:ext cx="4673726" cy="2341890"/>
-            <a:chOff x="1392116" y="4460400"/>
-            <a:chExt cx="4674943" cy="2291605"/>
+            <a:off x="6168008" y="3925522"/>
+            <a:ext cx="4673726" cy="2473476"/>
+            <a:chOff x="1392116" y="4460402"/>
+            <a:chExt cx="4674943" cy="2420366"/>
           </a:xfrm>
         </p:grpSpPr>
         <p:grpSp>
@@ -45112,10 +45561,10 @@
           </p:nvGrpSpPr>
           <p:grpSpPr>
             <a:xfrm>
-              <a:off x="1392116" y="4460400"/>
-              <a:ext cx="1425695" cy="2291605"/>
-              <a:chOff x="1392116" y="4460400"/>
-              <a:chExt cx="1425695" cy="2291605"/>
+              <a:off x="1392116" y="4460402"/>
+              <a:ext cx="1425695" cy="2420366"/>
+              <a:chOff x="1392116" y="4460402"/>
+              <a:chExt cx="1425695" cy="2420366"/>
             </a:xfrm>
           </p:grpSpPr>
           <p:sp>
@@ -45128,8 +45577,8 @@
             </p:nvSpPr>
             <p:spPr bwMode="auto">
               <a:xfrm>
-                <a:off x="1392116" y="4460400"/>
-                <a:ext cx="914399" cy="2291605"/>
+                <a:off x="1392116" y="4460402"/>
+                <a:ext cx="914399" cy="2420366"/>
               </a:xfrm>
               <a:prstGeom prst="rect">
                 <a:avLst/>
@@ -45368,9 +45817,9 @@
         <p:grpSpPr>
           <a:xfrm>
             <a:off x="922046" y="3925522"/>
-            <a:ext cx="4688730" cy="2341889"/>
+            <a:ext cx="4688730" cy="2473476"/>
             <a:chOff x="1336588" y="4211855"/>
-            <a:chExt cx="4689951" cy="2342499"/>
+            <a:chExt cx="4689951" cy="2474120"/>
           </a:xfrm>
         </p:grpSpPr>
         <p:grpSp>
@@ -45388,9 +45837,9 @@
           <p:grpSpPr>
             <a:xfrm>
               <a:off x="1336588" y="4211855"/>
-              <a:ext cx="1470172" cy="2342499"/>
+              <a:ext cx="1470172" cy="2474120"/>
               <a:chOff x="1336588" y="4211855"/>
-              <a:chExt cx="1470172" cy="2342499"/>
+              <a:chExt cx="1470172" cy="2474120"/>
             </a:xfrm>
           </p:grpSpPr>
           <p:sp>
@@ -45404,7 +45853,7 @@
             <p:spPr bwMode="auto">
               <a:xfrm>
                 <a:off x="1336588" y="4211855"/>
-                <a:ext cx="914399" cy="2342499"/>
+                <a:ext cx="914399" cy="2474120"/>
               </a:xfrm>
               <a:prstGeom prst="rect">
                 <a:avLst/>
@@ -46854,7 +47303,15 @@
                       <a:srgbClr val="FFFFFF"/>
                     </a:solidFill>
                   </a:rPr>
-                  <a:t>biggest = int.MinValue</a:t>
+                  <a:t>biggest = </a:t>
+                </a:r>
+                <a:r>
+                  <a:rPr lang="en-GB" sz="2000" dirty="0" err="1">
+                    <a:solidFill>
+                      <a:srgbClr val="FFFFFF"/>
+                    </a:solidFill>
+                  </a:rPr>
+                  <a:t>int.MinValue</a:t>
                 </a:r>
                 <a:endParaRPr lang="en-US" sz="2000" dirty="0">
                   <a:solidFill>
@@ -48381,8 +48838,8 @@
           <a:lstStyle/>
           <a:p>
             <a:r>
-              <a:rPr lang="bg-BG"/>
-              <a:t>Редица цели числа – решение</a:t>
+              <a:rPr lang="bg-BG" dirty="0"/>
+              <a:t>Решение: Редица цели числа</a:t>
             </a:r>
             <a:endParaRPr lang="en-US" dirty="0"/>
           </a:p>
@@ -48398,7 +48855,7 @@
         </p:nvSpPr>
         <p:spPr bwMode="auto">
           <a:xfrm>
-            <a:off x="549834" y="1344940"/>
+            <a:off x="696000" y="1379368"/>
             <a:ext cx="7771927" cy="4892373"/>
           </a:xfrm>
           <a:prstGeom prst="rect">
@@ -48705,7 +49162,7 @@
         </p:blipFill>
         <p:spPr bwMode="auto">
           <a:xfrm rot="21080663">
-            <a:off x="8294091" y="1787747"/>
+            <a:off x="8717198" y="1760938"/>
             <a:ext cx="1249959" cy="1249959"/>
           </a:xfrm>
           <a:prstGeom prst="rect">
@@ -48753,7 +49210,7 @@
         </p:blipFill>
         <p:spPr bwMode="auto">
           <a:xfrm>
-            <a:off x="9236852" y="2860129"/>
+            <a:off x="9659959" y="2833320"/>
             <a:ext cx="1536813" cy="1746457"/>
           </a:xfrm>
           <a:prstGeom prst="rect">
@@ -48801,7 +49258,7 @@
         </p:blipFill>
         <p:spPr bwMode="auto">
           <a:xfrm rot="348904">
-            <a:off x="10231995" y="4431456"/>
+            <a:off x="10655102" y="4404647"/>
             <a:ext cx="1379845" cy="1379845"/>
           </a:xfrm>
           <a:prstGeom prst="rect">
@@ -48833,7 +49290,7 @@
         </p:nvSpPr>
         <p:spPr>
           <a:xfrm>
-            <a:off x="549833" y="6357245"/>
+            <a:off x="1030801" y="6357269"/>
             <a:ext cx="10130398" cy="399981"/>
           </a:xfrm>
           <a:prstGeom prst="rect">
@@ -48965,7 +49422,7 @@
               <a:rPr lang="en-US" sz="1999" dirty="0">
                 <a:hlinkClick r:id="rId5"/>
               </a:rPr>
-              <a:t>https://judge.softuni.bg/Contests/Practice/Index/3157#7</a:t>
+              <a:t>https://judge.softuni.org/Contests/Practice/Index/3899#1</a:t>
             </a:r>
             <a:endParaRPr lang="en-US" sz="1999" dirty="0">
               <a:solidFill>
@@ -49616,12 +50073,16 @@
           <a:lstStyle/>
           <a:p>
             <a:r>
+              <a:rPr lang="bg-BG" noProof="1"/>
+              <a:t>Задача: </a:t>
+            </a:r>
+            <a:r>
               <a:rPr lang="ru-RU" noProof="1"/>
-              <a:t>Лява и дясна сума – условие</a:t>
+              <a:t>Лява и дясна сума </a:t>
             </a:r>
             <a:r>
               <a:rPr lang="en-US" noProof="1"/>
-              <a:t> (1)</a:t>
+              <a:t>(1)</a:t>
             </a:r>
             <a:endParaRPr lang="bg-BG" noProof="1"/>
           </a:p>

</xml_diff>